<commit_message>
More recursion updated lecture
</commit_message>
<xml_diff>
--- a/slides/On-Campus/13_01_More Recursion.pptx
+++ b/slides/On-Campus/13_01_More Recursion.pptx
@@ -148,173 +148,44 @@
 <pc:chgInfo xmlns:a="http://schemas.openxmlformats.org/drawingml/2006/main" xmlns:r="http://schemas.openxmlformats.org/officeDocument/2006/relationships" xmlns:ac="http://schemas.microsoft.com/office/drawing/2013/main/command" xmlns:pc="http://schemas.microsoft.com/office/powerpoint/2013/main/command">
   <pc:docChgLst>
     <pc:chgData name="Moraes,Marcia" userId="c9c67e8a-58e2-4733-9a1c-5d44fec4775b" providerId="ADAL" clId="{BF322DDB-2F5C-4464-8059-49CA23CDD3A7}"/>
-    <pc:docChg chg="custSel addSld modSld">
-      <pc:chgData name="Moraes,Marcia" userId="c9c67e8a-58e2-4733-9a1c-5d44fec4775b" providerId="ADAL" clId="{BF322DDB-2F5C-4464-8059-49CA23CDD3A7}" dt="2023-04-15T16:11:15.842" v="582" actId="5793"/>
+  </pc:docChgLst>
+  <pc:docChgLst>
+    <pc:chgData name="Moraes,Marcia" userId="c9c67e8a-58e2-4733-9a1c-5d44fec4775b" providerId="ADAL" clId="{58806465-151D-46CB-A69C-EFB3BC3DBF8E}"/>
+    <pc:docChg chg="custSel modSld">
+      <pc:chgData name="Moraes,Marcia" userId="c9c67e8a-58e2-4733-9a1c-5d44fec4775b" providerId="ADAL" clId="{58806465-151D-46CB-A69C-EFB3BC3DBF8E}" dt="2023-11-12T18:40:52.653" v="1"/>
       <pc:docMkLst>
         <pc:docMk/>
       </pc:docMkLst>
-      <pc:sldChg chg="modSp">
-        <pc:chgData name="Moraes,Marcia" userId="c9c67e8a-58e2-4733-9a1c-5d44fec4775b" providerId="ADAL" clId="{BF322DDB-2F5C-4464-8059-49CA23CDD3A7}" dt="2023-04-15T15:54:28.772" v="225" actId="5793"/>
-        <pc:sldMkLst>
-          <pc:docMk/>
-          <pc:sldMk cId="216470046" sldId="260"/>
-        </pc:sldMkLst>
-        <pc:spChg chg="mod">
-          <ac:chgData name="Moraes,Marcia" userId="c9c67e8a-58e2-4733-9a1c-5d44fec4775b" providerId="ADAL" clId="{BF322DDB-2F5C-4464-8059-49CA23CDD3A7}" dt="2023-04-15T15:52:49.235" v="68" actId="1076"/>
-          <ac:spMkLst>
-            <pc:docMk/>
-            <pc:sldMk cId="216470046" sldId="260"/>
-            <ac:spMk id="2" creationId="{3BD1F6C7-A6A1-EA40-95A5-49F0F4685C81}"/>
-          </ac:spMkLst>
-        </pc:spChg>
-        <pc:spChg chg="mod">
-          <ac:chgData name="Moraes,Marcia" userId="c9c67e8a-58e2-4733-9a1c-5d44fec4775b" providerId="ADAL" clId="{BF322DDB-2F5C-4464-8059-49CA23CDD3A7}" dt="2023-04-15T15:54:28.772" v="225" actId="5793"/>
-          <ac:spMkLst>
-            <pc:docMk/>
-            <pc:sldMk cId="216470046" sldId="260"/>
-            <ac:spMk id="3" creationId="{20275C6A-A900-BF4E-B253-6445E559FBAD}"/>
-          </ac:spMkLst>
-        </pc:spChg>
-      </pc:sldChg>
-      <pc:sldChg chg="modSp">
-        <pc:chgData name="Moraes,Marcia" userId="c9c67e8a-58e2-4733-9a1c-5d44fec4775b" providerId="ADAL" clId="{BF322DDB-2F5C-4464-8059-49CA23CDD3A7}" dt="2023-04-15T15:48:22.293" v="37" actId="20577"/>
-        <pc:sldMkLst>
-          <pc:docMk/>
-          <pc:sldMk cId="1725307835" sldId="261"/>
-        </pc:sldMkLst>
-        <pc:spChg chg="mod">
-          <ac:chgData name="Moraes,Marcia" userId="c9c67e8a-58e2-4733-9a1c-5d44fec4775b" providerId="ADAL" clId="{BF322DDB-2F5C-4464-8059-49CA23CDD3A7}" dt="2023-04-15T15:48:22.293" v="37" actId="20577"/>
-          <ac:spMkLst>
-            <pc:docMk/>
-            <pc:sldMk cId="1725307835" sldId="261"/>
-            <ac:spMk id="4" creationId="{12BA5B84-1638-5244-9FFD-57A46E238EFA}"/>
-          </ac:spMkLst>
-        </pc:spChg>
-      </pc:sldChg>
-      <pc:sldChg chg="modSp">
-        <pc:chgData name="Moraes,Marcia" userId="c9c67e8a-58e2-4733-9a1c-5d44fec4775b" providerId="ADAL" clId="{BF322DDB-2F5C-4464-8059-49CA23CDD3A7}" dt="2023-04-15T15:49:59.404" v="39" actId="1076"/>
-        <pc:sldMkLst>
-          <pc:docMk/>
-          <pc:sldMk cId="482737437" sldId="264"/>
-        </pc:sldMkLst>
-        <pc:spChg chg="mod">
-          <ac:chgData name="Moraes,Marcia" userId="c9c67e8a-58e2-4733-9a1c-5d44fec4775b" providerId="ADAL" clId="{BF322DDB-2F5C-4464-8059-49CA23CDD3A7}" dt="2023-04-15T15:49:55.159" v="38" actId="1076"/>
-          <ac:spMkLst>
-            <pc:docMk/>
-            <pc:sldMk cId="482737437" sldId="264"/>
-            <ac:spMk id="3" creationId="{B91BD0B4-1F45-8746-A09B-4DB16CF628F4}"/>
-          </ac:spMkLst>
-        </pc:spChg>
-        <pc:picChg chg="mod">
-          <ac:chgData name="Moraes,Marcia" userId="c9c67e8a-58e2-4733-9a1c-5d44fec4775b" providerId="ADAL" clId="{BF322DDB-2F5C-4464-8059-49CA23CDD3A7}" dt="2023-04-15T15:49:59.404" v="39" actId="1076"/>
-          <ac:picMkLst>
-            <pc:docMk/>
-            <pc:sldMk cId="482737437" sldId="264"/>
-            <ac:picMk id="5" creationId="{7FE34588-F818-AF29-3B3D-C620963A3D9B}"/>
-          </ac:picMkLst>
-        </pc:picChg>
-      </pc:sldChg>
-      <pc:sldChg chg="addSp delSp modSp add">
-        <pc:chgData name="Moraes,Marcia" userId="c9c67e8a-58e2-4733-9a1c-5d44fec4775b" providerId="ADAL" clId="{BF322DDB-2F5C-4464-8059-49CA23CDD3A7}" dt="2023-04-15T15:47:54.349" v="22" actId="1076"/>
+      <pc:sldChg chg="addSp delSp">
+        <pc:chgData name="Moraes,Marcia" userId="c9c67e8a-58e2-4733-9a1c-5d44fec4775b" providerId="ADAL" clId="{58806465-151D-46CB-A69C-EFB3BC3DBF8E}" dt="2023-11-12T18:40:52.653" v="1"/>
         <pc:sldMkLst>
           <pc:docMk/>
           <pc:sldMk cId="2571368551" sldId="272"/>
         </pc:sldMkLst>
-        <pc:spChg chg="mod">
-          <ac:chgData name="Moraes,Marcia" userId="c9c67e8a-58e2-4733-9a1c-5d44fec4775b" providerId="ADAL" clId="{BF322DDB-2F5C-4464-8059-49CA23CDD3A7}" dt="2023-04-15T15:47:54.349" v="22" actId="1076"/>
+        <pc:spChg chg="del">
+          <ac:chgData name="Moraes,Marcia" userId="c9c67e8a-58e2-4733-9a1c-5d44fec4775b" providerId="ADAL" clId="{58806465-151D-46CB-A69C-EFB3BC3DBF8E}" dt="2023-11-12T18:39:45.834" v="0" actId="478"/>
           <ac:spMkLst>
             <pc:docMk/>
             <pc:sldMk cId="2571368551" sldId="272"/>
-            <ac:spMk id="2" creationId="{84CD52E7-9878-46B0-B322-12FDC9581986}"/>
+            <ac:spMk id="5" creationId="{1E54CBCD-3447-4F03-970A-F1628F46BEF2}"/>
           </ac:spMkLst>
         </pc:spChg>
-        <pc:spChg chg="del">
-          <ac:chgData name="Moraes,Marcia" userId="c9c67e8a-58e2-4733-9a1c-5d44fec4775b" providerId="ADAL" clId="{BF322DDB-2F5C-4464-8059-49CA23CDD3A7}" dt="2023-04-15T15:34:58.734" v="1" actId="478"/>
+        <pc:spChg chg="add">
+          <ac:chgData name="Moraes,Marcia" userId="c9c67e8a-58e2-4733-9a1c-5d44fec4775b" providerId="ADAL" clId="{58806465-151D-46CB-A69C-EFB3BC3DBF8E}" dt="2023-11-12T18:40:52.653" v="1"/>
           <ac:spMkLst>
             <pc:docMk/>
             <pc:sldMk cId="2571368551" sldId="272"/>
-            <ac:spMk id="3" creationId="{5BC8B290-6C99-4763-BFC6-1EFE67A8FC35}"/>
+            <ac:spMk id="7" creationId="{C46EA5F7-AEC0-40D7-893C-CAA04D08439D}"/>
           </ac:spMkLst>
         </pc:spChg>
-        <pc:spChg chg="mod">
-          <ac:chgData name="Moraes,Marcia" userId="c9c67e8a-58e2-4733-9a1c-5d44fec4775b" providerId="ADAL" clId="{BF322DDB-2F5C-4464-8059-49CA23CDD3A7}" dt="2023-04-15T15:46:56.177" v="20" actId="1076"/>
-          <ac:spMkLst>
+        <pc:graphicFrameChg chg="add">
+          <ac:chgData name="Moraes,Marcia" userId="c9c67e8a-58e2-4733-9a1c-5d44fec4775b" providerId="ADAL" clId="{58806465-151D-46CB-A69C-EFB3BC3DBF8E}" dt="2023-11-12T18:40:52.653" v="1"/>
+          <ac:graphicFrameMkLst>
             <pc:docMk/>
             <pc:sldMk cId="2571368551" sldId="272"/>
-            <ac:spMk id="11" creationId="{BDA0DBC1-29A7-4498-B9AA-9B174D0FEC3E}"/>
-          </ac:spMkLst>
-        </pc:spChg>
-        <pc:picChg chg="add mod">
-          <ac:chgData name="Moraes,Marcia" userId="c9c67e8a-58e2-4733-9a1c-5d44fec4775b" providerId="ADAL" clId="{BF322DDB-2F5C-4464-8059-49CA23CDD3A7}" dt="2023-04-15T15:46:44.086" v="18" actId="1076"/>
-          <ac:picMkLst>
-            <pc:docMk/>
-            <pc:sldMk cId="2571368551" sldId="272"/>
-            <ac:picMk id="1026" creationId="{7582B245-47AB-4C06-B05E-2204AB28160C}"/>
-          </ac:picMkLst>
-        </pc:picChg>
-        <pc:picChg chg="del">
-          <ac:chgData name="Moraes,Marcia" userId="c9c67e8a-58e2-4733-9a1c-5d44fec4775b" providerId="ADAL" clId="{BF322DDB-2F5C-4464-8059-49CA23CDD3A7}" dt="2023-04-15T15:46:26.072" v="13" actId="478"/>
-          <ac:picMkLst>
-            <pc:docMk/>
-            <pc:sldMk cId="2571368551" sldId="272"/>
-            <ac:picMk id="1032" creationId="{8F8F76D5-8E26-456C-8557-2CCE2B32A064}"/>
-          </ac:picMkLst>
-        </pc:picChg>
-      </pc:sldChg>
-      <pc:sldChg chg="addSp modSp add modAnim">
-        <pc:chgData name="Moraes,Marcia" userId="c9c67e8a-58e2-4733-9a1c-5d44fec4775b" providerId="ADAL" clId="{BF322DDB-2F5C-4464-8059-49CA23CDD3A7}" dt="2023-04-15T16:11:15.842" v="582" actId="5793"/>
-        <pc:sldMkLst>
-          <pc:docMk/>
-          <pc:sldMk cId="3788944321" sldId="273"/>
-        </pc:sldMkLst>
-        <pc:spChg chg="mod">
-          <ac:chgData name="Moraes,Marcia" userId="c9c67e8a-58e2-4733-9a1c-5d44fec4775b" providerId="ADAL" clId="{BF322DDB-2F5C-4464-8059-49CA23CDD3A7}" dt="2023-04-15T16:09:22.917" v="528" actId="1076"/>
-          <ac:spMkLst>
-            <pc:docMk/>
-            <pc:sldMk cId="3788944321" sldId="273"/>
-            <ac:spMk id="2" creationId="{3BD1F6C7-A6A1-EA40-95A5-49F0F4685C81}"/>
-          </ac:spMkLst>
-        </pc:spChg>
-        <pc:spChg chg="mod">
-          <ac:chgData name="Moraes,Marcia" userId="c9c67e8a-58e2-4733-9a1c-5d44fec4775b" providerId="ADAL" clId="{BF322DDB-2F5C-4464-8059-49CA23CDD3A7}" dt="2023-04-15T16:09:18.057" v="527" actId="20577"/>
-          <ac:spMkLst>
-            <pc:docMk/>
-            <pc:sldMk cId="3788944321" sldId="273"/>
-            <ac:spMk id="3" creationId="{20275C6A-A900-BF4E-B253-6445E559FBAD}"/>
-          </ac:spMkLst>
-        </pc:spChg>
-        <pc:spChg chg="add mod">
-          <ac:chgData name="Moraes,Marcia" userId="c9c67e8a-58e2-4733-9a1c-5d44fec4775b" providerId="ADAL" clId="{BF322DDB-2F5C-4464-8059-49CA23CDD3A7}" dt="2023-04-15T16:08:44.698" v="466" actId="207"/>
-          <ac:spMkLst>
-            <pc:docMk/>
-            <pc:sldMk cId="3788944321" sldId="273"/>
-            <ac:spMk id="5" creationId="{84CA57EC-5756-4B51-854C-35073E365E6F}"/>
-          </ac:spMkLst>
-        </pc:spChg>
-        <pc:spChg chg="add mod">
-          <ac:chgData name="Moraes,Marcia" userId="c9c67e8a-58e2-4733-9a1c-5d44fec4775b" providerId="ADAL" clId="{BF322DDB-2F5C-4464-8059-49CA23CDD3A7}" dt="2023-04-15T16:09:03.089" v="504" actId="20577"/>
-          <ac:spMkLst>
-            <pc:docMk/>
-            <pc:sldMk cId="3788944321" sldId="273"/>
-            <ac:spMk id="6" creationId="{5E899E58-A59A-4076-9C86-6AF0DA875B57}"/>
-          </ac:spMkLst>
-        </pc:spChg>
-        <pc:spChg chg="add mod">
-          <ac:chgData name="Moraes,Marcia" userId="c9c67e8a-58e2-4733-9a1c-5d44fec4775b" providerId="ADAL" clId="{BF322DDB-2F5C-4464-8059-49CA23CDD3A7}" dt="2023-04-15T16:11:15.842" v="582" actId="5793"/>
-          <ac:spMkLst>
-            <pc:docMk/>
-            <pc:sldMk cId="3788944321" sldId="273"/>
-            <ac:spMk id="7" creationId="{48BE5E03-4A1D-45B8-B7C6-27AFC839E46E}"/>
-          </ac:spMkLst>
-        </pc:spChg>
-        <pc:picChg chg="add mod">
-          <ac:chgData name="Moraes,Marcia" userId="c9c67e8a-58e2-4733-9a1c-5d44fec4775b" providerId="ADAL" clId="{BF322DDB-2F5C-4464-8059-49CA23CDD3A7}" dt="2023-04-15T15:57:30.358" v="391" actId="1076"/>
-          <ac:picMkLst>
-            <pc:docMk/>
-            <pc:sldMk cId="3788944321" sldId="273"/>
-            <ac:picMk id="4" creationId="{D6041E05-E9CE-43FB-8913-F0D56CD58D25}"/>
-          </ac:picMkLst>
-        </pc:picChg>
+            <ac:graphicFrameMk id="8" creationId="{07C62F30-3C9C-4AF5-865C-4C1E0C950E9D}"/>
+          </ac:graphicFrameMkLst>
+        </pc:graphicFrameChg>
       </pc:sldChg>
     </pc:docChg>
   </pc:docChgLst>
@@ -403,7 +274,7 @@
           <a:p>
             <a:fld id="{4D7E51A5-B478-1E40-8CBB-0DAA8831E99D}" type="datetimeFigureOut">
               <a:rPr lang="en-US" smtClean="0"/>
-              <a:t>4/15/2023</a:t>
+              <a:t>11/12/2023</a:t>
             </a:fld>
             <a:endParaRPr lang="en-US"/>
           </a:p>
@@ -568,7 +439,7 @@
           <a:p>
             <a:fld id="{D0ED587F-861E-6740-9643-E3DDAE89B8D6}" type="datetimeFigureOut">
               <a:rPr lang="en-US" smtClean="0"/>
-              <a:t>4/15/2023</a:t>
+              <a:t>11/12/2023</a:t>
             </a:fld>
             <a:endParaRPr lang="en-US"/>
           </a:p>
@@ -9382,427 +9253,6 @@
           </a:p>
         </p:txBody>
       </p:sp>
-      <p:sp>
-        <p:nvSpPr>
-          <p:cNvPr id="5" name="TextBox 4">
-            <a:extLst>
-              <a:ext uri="{FF2B5EF4-FFF2-40B4-BE49-F238E27FC236}">
-                <a16:creationId xmlns:a16="http://schemas.microsoft.com/office/drawing/2014/main" id="{1E54CBCD-3447-4F03-970A-F1628F46BEF2}"/>
-              </a:ext>
-            </a:extLst>
-          </p:cNvPr>
-          <p:cNvSpPr txBox="1"/>
-          <p:nvPr/>
-        </p:nvSpPr>
-        <p:spPr>
-          <a:xfrm>
-            <a:off x="10570030" y="3886200"/>
-            <a:ext cx="3069770" cy="3477875"/>
-          </a:xfrm>
-          <a:prstGeom prst="rect">
-            <a:avLst/>
-          </a:prstGeom>
-          <a:solidFill>
-            <a:schemeClr val="bg2">
-              <a:lumMod val="40000"/>
-              <a:lumOff val="60000"/>
-            </a:schemeClr>
-          </a:solidFill>
-        </p:spPr>
-        <p:txBody>
-          <a:bodyPr wrap="square" rtlCol="0">
-            <a:spAutoFit/>
-          </a:bodyPr>
-          <a:lstStyle/>
-          <a:p>
-            <a:pPr marL="0" marR="0" lvl="0" indent="0" algn="l" defTabSz="509292" rtl="0" eaLnBrk="1" fontAlgn="auto" latinLnBrk="0" hangingPunct="1">
-              <a:lnSpc>
-                <a:spcPct val="100000"/>
-              </a:lnSpc>
-              <a:spcBef>
-                <a:spcPts val="0"/>
-              </a:spcBef>
-              <a:spcAft>
-                <a:spcPts val="0"/>
-              </a:spcAft>
-              <a:buClrTx/>
-              <a:buSzTx/>
-              <a:buFontTx/>
-              <a:buNone/>
-              <a:tabLst/>
-              <a:defRPr/>
-            </a:pPr>
-            <a:r>
-              <a:rPr kumimoji="0" lang="en-US" sz="2000" b="0" i="0" u="none" strike="noStrike" kern="1200" cap="none" spc="0" normalizeH="0" baseline="0" noProof="0" dirty="0">
-                <a:ln>
-                  <a:noFill/>
-                </a:ln>
-                <a:solidFill>
-                  <a:srgbClr val="000000"/>
-                </a:solidFill>
-                <a:effectLst/>
-                <a:uLnTx/>
-                <a:uFillTx/>
-                <a:latin typeface="Arial" panose="020B0604020202020204"/>
-                <a:ea typeface="+mn-ea"/>
-                <a:cs typeface="+mn-cs"/>
-              </a:rPr>
-              <a:t>Monday Help Desk – </a:t>
-            </a:r>
-          </a:p>
-          <a:p>
-            <a:pPr marL="0" marR="0" lvl="0" indent="0" algn="l" defTabSz="509292" rtl="0" eaLnBrk="1" fontAlgn="auto" latinLnBrk="0" hangingPunct="1">
-              <a:lnSpc>
-                <a:spcPct val="100000"/>
-              </a:lnSpc>
-              <a:spcBef>
-                <a:spcPts val="0"/>
-              </a:spcBef>
-              <a:spcAft>
-                <a:spcPts val="0"/>
-              </a:spcAft>
-              <a:buClrTx/>
-              <a:buSzTx/>
-              <a:buFontTx/>
-              <a:buNone/>
-              <a:tabLst/>
-              <a:defRPr/>
-            </a:pPr>
-            <a:r>
-              <a:rPr kumimoji="0" lang="en-US" sz="2000" b="0" i="0" u="none" strike="noStrike" kern="1200" cap="none" spc="0" normalizeH="0" baseline="0" noProof="0" dirty="0">
-                <a:ln>
-                  <a:noFill/>
-                </a:ln>
-                <a:solidFill>
-                  <a:srgbClr val="000000"/>
-                </a:solidFill>
-                <a:effectLst/>
-                <a:uLnTx/>
-                <a:uFillTx/>
-                <a:latin typeface="Arial" panose="020B0604020202020204"/>
-                <a:ea typeface="+mn-ea"/>
-                <a:cs typeface="+mn-cs"/>
-              </a:rPr>
-              <a:t>12-2pm CSB120</a:t>
-            </a:r>
-          </a:p>
-          <a:p>
-            <a:pPr marL="0" marR="0" lvl="0" indent="0" algn="l" defTabSz="509292" rtl="0" eaLnBrk="1" fontAlgn="auto" latinLnBrk="0" hangingPunct="1">
-              <a:lnSpc>
-                <a:spcPct val="100000"/>
-              </a:lnSpc>
-              <a:spcBef>
-                <a:spcPts val="0"/>
-              </a:spcBef>
-              <a:spcAft>
-                <a:spcPts val="0"/>
-              </a:spcAft>
-              <a:buClrTx/>
-              <a:buSzTx/>
-              <a:buFontTx/>
-              <a:buNone/>
-              <a:tabLst/>
-              <a:defRPr/>
-            </a:pPr>
-            <a:endParaRPr kumimoji="0" lang="en-US" sz="2000" b="0" i="0" u="none" strike="noStrike" kern="1200" cap="none" spc="0" normalizeH="0" baseline="0" noProof="0" dirty="0">
-              <a:ln>
-                <a:noFill/>
-              </a:ln>
-              <a:solidFill>
-                <a:srgbClr val="000000"/>
-              </a:solidFill>
-              <a:effectLst/>
-              <a:uLnTx/>
-              <a:uFillTx/>
-              <a:latin typeface="Arial" panose="020B0604020202020204"/>
-              <a:ea typeface="+mn-ea"/>
-              <a:cs typeface="+mn-cs"/>
-            </a:endParaRPr>
-          </a:p>
-          <a:p>
-            <a:pPr marL="0" marR="0" lvl="0" indent="0" algn="l" defTabSz="509292" rtl="0" eaLnBrk="1" fontAlgn="auto" latinLnBrk="0" hangingPunct="1">
-              <a:lnSpc>
-                <a:spcPct val="100000"/>
-              </a:lnSpc>
-              <a:spcBef>
-                <a:spcPts val="0"/>
-              </a:spcBef>
-              <a:spcAft>
-                <a:spcPts val="0"/>
-              </a:spcAft>
-              <a:buClrTx/>
-              <a:buSzTx/>
-              <a:buFontTx/>
-              <a:buNone/>
-              <a:tabLst/>
-              <a:defRPr/>
-            </a:pPr>
-            <a:r>
-              <a:rPr kumimoji="0" lang="en-US" sz="2000" b="0" i="0" u="none" strike="noStrike" kern="1200" cap="none" spc="0" normalizeH="0" baseline="0" noProof="0" dirty="0">
-                <a:ln>
-                  <a:noFill/>
-                </a:ln>
-                <a:solidFill>
-                  <a:srgbClr val="000000"/>
-                </a:solidFill>
-                <a:effectLst/>
-                <a:uLnTx/>
-                <a:uFillTx/>
-                <a:latin typeface="Arial" panose="020B0604020202020204"/>
-                <a:ea typeface="+mn-ea"/>
-                <a:cs typeface="+mn-cs"/>
-              </a:rPr>
-              <a:t>Monday Help Session – </a:t>
-            </a:r>
-          </a:p>
-          <a:p>
-            <a:pPr marL="0" marR="0" lvl="0" indent="0" algn="l" defTabSz="509292" rtl="0" eaLnBrk="1" fontAlgn="auto" latinLnBrk="0" hangingPunct="1">
-              <a:lnSpc>
-                <a:spcPct val="100000"/>
-              </a:lnSpc>
-              <a:spcBef>
-                <a:spcPts val="0"/>
-              </a:spcBef>
-              <a:spcAft>
-                <a:spcPts val="0"/>
-              </a:spcAft>
-              <a:buClrTx/>
-              <a:buSzTx/>
-              <a:buFontTx/>
-              <a:buNone/>
-              <a:tabLst/>
-              <a:defRPr/>
-            </a:pPr>
-            <a:r>
-              <a:rPr kumimoji="0" lang="en-US" sz="2000" b="0" i="0" u="none" strike="noStrike" kern="1200" cap="none" spc="0" normalizeH="0" baseline="0" noProof="0" dirty="0">
-                <a:ln>
-                  <a:noFill/>
-                </a:ln>
-                <a:solidFill>
-                  <a:srgbClr val="000000"/>
-                </a:solidFill>
-                <a:effectLst/>
-                <a:uLnTx/>
-                <a:uFillTx/>
-                <a:latin typeface="Arial" panose="020B0604020202020204"/>
-                <a:ea typeface="+mn-ea"/>
-                <a:cs typeface="+mn-cs"/>
-              </a:rPr>
-              <a:t>3-4pm CSB325</a:t>
-            </a:r>
-          </a:p>
-          <a:p>
-            <a:pPr marL="0" marR="0" lvl="0" indent="0" algn="l" defTabSz="509292" rtl="0" eaLnBrk="1" fontAlgn="auto" latinLnBrk="0" hangingPunct="1">
-              <a:lnSpc>
-                <a:spcPct val="100000"/>
-              </a:lnSpc>
-              <a:spcBef>
-                <a:spcPts val="0"/>
-              </a:spcBef>
-              <a:spcAft>
-                <a:spcPts val="0"/>
-              </a:spcAft>
-              <a:buClrTx/>
-              <a:buSzTx/>
-              <a:buFontTx/>
-              <a:buNone/>
-              <a:tabLst/>
-              <a:defRPr/>
-            </a:pPr>
-            <a:endParaRPr kumimoji="0" lang="en-US" sz="2000" b="0" i="0" u="none" strike="noStrike" kern="1200" cap="none" spc="0" normalizeH="0" baseline="0" noProof="0" dirty="0">
-              <a:ln>
-                <a:noFill/>
-              </a:ln>
-              <a:solidFill>
-                <a:srgbClr val="000000"/>
-              </a:solidFill>
-              <a:effectLst/>
-              <a:uLnTx/>
-              <a:uFillTx/>
-              <a:latin typeface="Arial" panose="020B0604020202020204"/>
-              <a:ea typeface="+mn-ea"/>
-              <a:cs typeface="+mn-cs"/>
-            </a:endParaRPr>
-          </a:p>
-          <a:p>
-            <a:pPr marL="0" marR="0" lvl="0" indent="0" algn="l" defTabSz="509292" rtl="0" eaLnBrk="1" fontAlgn="auto" latinLnBrk="0" hangingPunct="1">
-              <a:lnSpc>
-                <a:spcPct val="100000"/>
-              </a:lnSpc>
-              <a:spcBef>
-                <a:spcPts val="0"/>
-              </a:spcBef>
-              <a:spcAft>
-                <a:spcPts val="0"/>
-              </a:spcAft>
-              <a:buClrTx/>
-              <a:buSzTx/>
-              <a:buFontTx/>
-              <a:buNone/>
-              <a:tabLst/>
-              <a:defRPr/>
-            </a:pPr>
-            <a:r>
-              <a:rPr kumimoji="0" lang="en-US" sz="2000" b="0" i="0" u="none" strike="noStrike" kern="1200" cap="none" spc="0" normalizeH="0" baseline="0" noProof="0" dirty="0">
-                <a:ln>
-                  <a:noFill/>
-                </a:ln>
-                <a:solidFill>
-                  <a:srgbClr val="000000"/>
-                </a:solidFill>
-                <a:effectLst/>
-                <a:uLnTx/>
-                <a:uFillTx/>
-                <a:latin typeface="Arial" panose="020B0604020202020204"/>
-                <a:ea typeface="+mn-ea"/>
-                <a:cs typeface="+mn-cs"/>
-              </a:rPr>
-              <a:t>Tuesday Help Desk – </a:t>
-            </a:r>
-          </a:p>
-          <a:p>
-            <a:pPr marL="0" marR="0" lvl="0" indent="0" algn="l" defTabSz="509292" rtl="0" eaLnBrk="1" fontAlgn="auto" latinLnBrk="0" hangingPunct="1">
-              <a:lnSpc>
-                <a:spcPct val="100000"/>
-              </a:lnSpc>
-              <a:spcBef>
-                <a:spcPts val="0"/>
-              </a:spcBef>
-              <a:spcAft>
-                <a:spcPts val="0"/>
-              </a:spcAft>
-              <a:buClrTx/>
-              <a:buSzTx/>
-              <a:buFontTx/>
-              <a:buNone/>
-              <a:tabLst/>
-              <a:defRPr/>
-            </a:pPr>
-            <a:r>
-              <a:rPr kumimoji="0" lang="en-US" sz="2000" b="0" i="0" u="none" strike="noStrike" kern="1200" cap="none" spc="0" normalizeH="0" baseline="0" noProof="0" dirty="0">
-                <a:ln>
-                  <a:noFill/>
-                </a:ln>
-                <a:solidFill>
-                  <a:srgbClr val="000000"/>
-                </a:solidFill>
-                <a:effectLst/>
-                <a:uLnTx/>
-                <a:uFillTx/>
-                <a:latin typeface="Arial" panose="020B0604020202020204"/>
-                <a:ea typeface="+mn-ea"/>
-                <a:cs typeface="+mn-cs"/>
-              </a:rPr>
-              <a:t>6-8pm Teams</a:t>
-            </a:r>
-          </a:p>
-          <a:p>
-            <a:pPr marL="0" marR="0" lvl="0" indent="0" algn="l" defTabSz="509292" rtl="0" eaLnBrk="1" fontAlgn="auto" latinLnBrk="0" hangingPunct="1">
-              <a:lnSpc>
-                <a:spcPct val="100000"/>
-              </a:lnSpc>
-              <a:spcBef>
-                <a:spcPts val="0"/>
-              </a:spcBef>
-              <a:spcAft>
-                <a:spcPts val="0"/>
-              </a:spcAft>
-              <a:buClrTx/>
-              <a:buSzTx/>
-              <a:buFontTx/>
-              <a:buNone/>
-              <a:tabLst/>
-              <a:defRPr/>
-            </a:pPr>
-            <a:endParaRPr kumimoji="0" lang="en-US" sz="2000" b="0" i="0" u="none" strike="noStrike" kern="1200" cap="none" spc="0" normalizeH="0" baseline="0" noProof="0" dirty="0">
-              <a:ln>
-                <a:noFill/>
-              </a:ln>
-              <a:solidFill>
-                <a:srgbClr val="000000"/>
-              </a:solidFill>
-              <a:effectLst/>
-              <a:uLnTx/>
-              <a:uFillTx/>
-              <a:latin typeface="Arial" panose="020B0604020202020204"/>
-              <a:ea typeface="+mn-ea"/>
-              <a:cs typeface="+mn-cs"/>
-            </a:endParaRPr>
-          </a:p>
-          <a:p>
-            <a:pPr marL="0" marR="0" lvl="0" indent="0" algn="l" defTabSz="509292" rtl="0" eaLnBrk="1" fontAlgn="auto" latinLnBrk="0" hangingPunct="1">
-              <a:lnSpc>
-                <a:spcPct val="100000"/>
-              </a:lnSpc>
-              <a:spcBef>
-                <a:spcPts val="0"/>
-              </a:spcBef>
-              <a:spcAft>
-                <a:spcPts val="0"/>
-              </a:spcAft>
-              <a:buClrTx/>
-              <a:buSzTx/>
-              <a:buFontTx/>
-              <a:buNone/>
-              <a:tabLst/>
-              <a:defRPr/>
-            </a:pPr>
-            <a:r>
-              <a:rPr kumimoji="0" lang="en-US" sz="2000" b="0" i="0" u="none" strike="noStrike" kern="1200" cap="none" spc="0" normalizeH="0" baseline="0" noProof="0" dirty="0">
-                <a:ln>
-                  <a:noFill/>
-                </a:ln>
-                <a:solidFill>
-                  <a:srgbClr val="000000"/>
-                </a:solidFill>
-                <a:effectLst/>
-                <a:uLnTx/>
-                <a:uFillTx/>
-                <a:latin typeface="Arial" panose="020B0604020202020204"/>
-                <a:ea typeface="+mn-ea"/>
-                <a:cs typeface="+mn-cs"/>
-              </a:rPr>
-              <a:t>Tuesday Help Session –</a:t>
-            </a:r>
-          </a:p>
-          <a:p>
-            <a:pPr marL="0" marR="0" lvl="0" indent="0" algn="l" defTabSz="509292" rtl="0" eaLnBrk="1" fontAlgn="auto" latinLnBrk="0" hangingPunct="1">
-              <a:lnSpc>
-                <a:spcPct val="100000"/>
-              </a:lnSpc>
-              <a:spcBef>
-                <a:spcPts val="0"/>
-              </a:spcBef>
-              <a:spcAft>
-                <a:spcPts val="0"/>
-              </a:spcAft>
-              <a:buClrTx/>
-              <a:buSzTx/>
-              <a:buFontTx/>
-              <a:buNone/>
-              <a:tabLst/>
-              <a:defRPr/>
-            </a:pPr>
-            <a:r>
-              <a:rPr kumimoji="0" lang="en-US" sz="2000" b="0" i="0" u="none" strike="noStrike" kern="1200" cap="none" spc="0" normalizeH="0" baseline="0" noProof="0" dirty="0">
-                <a:ln>
-                  <a:noFill/>
-                </a:ln>
-                <a:solidFill>
-                  <a:srgbClr val="000000"/>
-                </a:solidFill>
-                <a:effectLst/>
-                <a:uLnTx/>
-                <a:uFillTx/>
-                <a:latin typeface="Arial" panose="020B0604020202020204"/>
-                <a:ea typeface="+mn-ea"/>
-                <a:cs typeface="+mn-cs"/>
-              </a:rPr>
-              <a:t>10-11am Teams </a:t>
-            </a:r>
-          </a:p>
-        </p:txBody>
-      </p:sp>
       <p:pic>
         <p:nvPicPr>
           <p:cNvPr id="1026" name="Picture 2" descr="Like what you do, and then you will do your best. - Katherine Johnson">
@@ -9850,6 +9300,1439 @@
           </a:extLst>
         </p:spPr>
       </p:pic>
+      <p:sp>
+        <p:nvSpPr>
+          <p:cNvPr id="7" name="TextBox 6">
+            <a:extLst>
+              <a:ext uri="{FF2B5EF4-FFF2-40B4-BE49-F238E27FC236}">
+                <a16:creationId xmlns:a16="http://schemas.microsoft.com/office/drawing/2014/main" id="{C46EA5F7-AEC0-40D7-893C-CAA04D08439D}"/>
+              </a:ext>
+            </a:extLst>
+          </p:cNvPr>
+          <p:cNvSpPr txBox="1"/>
+          <p:nvPr/>
+        </p:nvSpPr>
+        <p:spPr>
+          <a:xfrm flipH="1">
+            <a:off x="9942181" y="3648975"/>
+            <a:ext cx="2444933" cy="400110"/>
+          </a:xfrm>
+          <a:prstGeom prst="rect">
+            <a:avLst/>
+          </a:prstGeom>
+          <a:noFill/>
+        </p:spPr>
+        <p:txBody>
+          <a:bodyPr wrap="square" rtlCol="0">
+            <a:spAutoFit/>
+          </a:bodyPr>
+          <a:lstStyle/>
+          <a:p>
+            <a:r>
+              <a:rPr lang="en-US" dirty="0"/>
+              <a:t>Help Desk</a:t>
+            </a:r>
+          </a:p>
+        </p:txBody>
+      </p:sp>
+      <p:graphicFrame>
+        <p:nvGraphicFramePr>
+          <p:cNvPr id="8" name="Table 7">
+            <a:extLst>
+              <a:ext uri="{FF2B5EF4-FFF2-40B4-BE49-F238E27FC236}">
+                <a16:creationId xmlns:a16="http://schemas.microsoft.com/office/drawing/2014/main" id="{07C62F30-3C9C-4AF5-865C-4C1E0C950E9D}"/>
+              </a:ext>
+            </a:extLst>
+          </p:cNvPr>
+          <p:cNvGraphicFramePr>
+            <a:graphicFrameLocks noGrp="1"/>
+          </p:cNvGraphicFramePr>
+          <p:nvPr>
+            <p:extLst>
+              <p:ext uri="{D42A27DB-BD31-4B8C-83A1-F6EECF244321}">
+                <p14:modId xmlns:p14="http://schemas.microsoft.com/office/powerpoint/2010/main" val="1214545650"/>
+              </p:ext>
+            </p:extLst>
+          </p:nvPr>
+        </p:nvGraphicFramePr>
+        <p:xfrm>
+          <a:off x="9987253" y="4063757"/>
+          <a:ext cx="3572199" cy="3253859"/>
+        </p:xfrm>
+        <a:graphic>
+          <a:graphicData uri="http://schemas.openxmlformats.org/drawingml/2006/table">
+            <a:tbl>
+              <a:tblPr firstRow="1">
+                <a:tableStyleId>{5C22544A-7EE6-4342-B048-85BDC9FD1C3A}</a:tableStyleId>
+              </a:tblPr>
+              <a:tblGrid>
+                <a:gridCol w="1105468">
+                  <a:extLst>
+                    <a:ext uri="{9D8B030D-6E8A-4147-A177-3AD203B41FA5}">
+                      <a16:colId xmlns:a16="http://schemas.microsoft.com/office/drawing/2014/main" val="1333462331"/>
+                    </a:ext>
+                  </a:extLst>
+                </a:gridCol>
+                <a:gridCol w="2466731">
+                  <a:extLst>
+                    <a:ext uri="{9D8B030D-6E8A-4147-A177-3AD203B41FA5}">
+                      <a16:colId xmlns:a16="http://schemas.microsoft.com/office/drawing/2014/main" val="668155110"/>
+                    </a:ext>
+                  </a:extLst>
+                </a:gridCol>
+              </a:tblGrid>
+              <a:tr h="165373">
+                <a:tc>
+                  <a:txBody>
+                    <a:bodyPr/>
+                    <a:lstStyle/>
+                    <a:p>
+                      <a:pPr marL="0" marR="0">
+                        <a:lnSpc>
+                          <a:spcPct val="107000"/>
+                        </a:lnSpc>
+                        <a:spcBef>
+                          <a:spcPts val="0"/>
+                        </a:spcBef>
+                        <a:spcAft>
+                          <a:spcPts val="800"/>
+                        </a:spcAft>
+                      </a:pPr>
+                      <a:r>
+                        <a:rPr lang="en-US" sz="1600" dirty="0">
+                          <a:solidFill>
+                            <a:schemeClr val="tx1"/>
+                          </a:solidFill>
+                          <a:effectLst/>
+                        </a:rPr>
+                        <a:t>Day</a:t>
+                      </a:r>
+                      <a:endParaRPr lang="en-US" sz="1600" dirty="0">
+                        <a:solidFill>
+                          <a:schemeClr val="tx1"/>
+                        </a:solidFill>
+                        <a:effectLst/>
+                        <a:latin typeface="Calibri" panose="020F0502020204030204" pitchFamily="34" charset="0"/>
+                        <a:ea typeface="Calibri" panose="020F0502020204030204" pitchFamily="34" charset="0"/>
+                        <a:cs typeface="Times New Roman" panose="02020603050405020304" pitchFamily="18" charset="0"/>
+                      </a:endParaRPr>
+                    </a:p>
+                  </a:txBody>
+                  <a:tcPr marL="15875" marR="15875" marT="15875" marB="15875" anchor="ctr">
+                    <a:lnL w="12700" cap="flat" cmpd="sng" algn="ctr">
+                      <a:solidFill>
+                        <a:schemeClr val="tx1"/>
+                      </a:solidFill>
+                      <a:prstDash val="solid"/>
+                      <a:round/>
+                      <a:headEnd type="none" w="med" len="med"/>
+                      <a:tailEnd type="none" w="med" len="med"/>
+                    </a:lnL>
+                    <a:lnR w="12700" cap="flat" cmpd="sng" algn="ctr">
+                      <a:solidFill>
+                        <a:schemeClr val="tx1"/>
+                      </a:solidFill>
+                      <a:prstDash val="solid"/>
+                      <a:round/>
+                      <a:headEnd type="none" w="med" len="med"/>
+                      <a:tailEnd type="none" w="med" len="med"/>
+                    </a:lnR>
+                    <a:lnT w="12700" cap="flat" cmpd="sng" algn="ctr">
+                      <a:solidFill>
+                        <a:schemeClr val="tx1"/>
+                      </a:solidFill>
+                      <a:prstDash val="solid"/>
+                      <a:round/>
+                      <a:headEnd type="none" w="med" len="med"/>
+                      <a:tailEnd type="none" w="med" len="med"/>
+                    </a:lnT>
+                    <a:lnB w="12700" cap="flat" cmpd="sng" algn="ctr">
+                      <a:solidFill>
+                        <a:schemeClr val="tx1"/>
+                      </a:solidFill>
+                      <a:prstDash val="solid"/>
+                      <a:round/>
+                      <a:headEnd type="none" w="med" len="med"/>
+                      <a:tailEnd type="none" w="med" len="med"/>
+                    </a:lnB>
+                    <a:lnTlToBr w="12700" cmpd="sng">
+                      <a:noFill/>
+                      <a:prstDash val="solid"/>
+                    </a:lnTlToBr>
+                    <a:lnBlToTr w="12700" cmpd="sng">
+                      <a:noFill/>
+                      <a:prstDash val="solid"/>
+                    </a:lnBlToTr>
+                    <a:solidFill>
+                      <a:schemeClr val="bg1"/>
+                    </a:solidFill>
+                  </a:tcPr>
+                </a:tc>
+                <a:tc>
+                  <a:txBody>
+                    <a:bodyPr/>
+                    <a:lstStyle/>
+                    <a:p>
+                      <a:pPr marL="0" marR="0">
+                        <a:lnSpc>
+                          <a:spcPct val="107000"/>
+                        </a:lnSpc>
+                        <a:spcBef>
+                          <a:spcPts val="0"/>
+                        </a:spcBef>
+                        <a:spcAft>
+                          <a:spcPts val="800"/>
+                        </a:spcAft>
+                      </a:pPr>
+                      <a:r>
+                        <a:rPr lang="en-US" sz="1600" dirty="0">
+                          <a:solidFill>
+                            <a:schemeClr val="tx1"/>
+                          </a:solidFill>
+                          <a:effectLst/>
+                        </a:rPr>
+                        <a:t>Time : Room</a:t>
+                      </a:r>
+                      <a:endParaRPr lang="en-US" sz="1600" dirty="0">
+                        <a:solidFill>
+                          <a:schemeClr val="tx1"/>
+                        </a:solidFill>
+                        <a:effectLst/>
+                        <a:latin typeface="Calibri" panose="020F0502020204030204" pitchFamily="34" charset="0"/>
+                        <a:ea typeface="Calibri" panose="020F0502020204030204" pitchFamily="34" charset="0"/>
+                        <a:cs typeface="Times New Roman" panose="02020603050405020304" pitchFamily="18" charset="0"/>
+                      </a:endParaRPr>
+                    </a:p>
+                  </a:txBody>
+                  <a:tcPr marL="15875" marR="15875" marT="15875" marB="15875" anchor="ctr">
+                    <a:lnL w="12700" cap="flat" cmpd="sng" algn="ctr">
+                      <a:solidFill>
+                        <a:schemeClr val="tx1"/>
+                      </a:solidFill>
+                      <a:prstDash val="solid"/>
+                      <a:round/>
+                      <a:headEnd type="none" w="med" len="med"/>
+                      <a:tailEnd type="none" w="med" len="med"/>
+                    </a:lnL>
+                    <a:lnR w="12700" cap="flat" cmpd="sng" algn="ctr">
+                      <a:solidFill>
+                        <a:schemeClr val="tx1"/>
+                      </a:solidFill>
+                      <a:prstDash val="solid"/>
+                      <a:round/>
+                      <a:headEnd type="none" w="med" len="med"/>
+                      <a:tailEnd type="none" w="med" len="med"/>
+                    </a:lnR>
+                    <a:lnT w="12700" cap="flat" cmpd="sng" algn="ctr">
+                      <a:solidFill>
+                        <a:schemeClr val="tx1"/>
+                      </a:solidFill>
+                      <a:prstDash val="solid"/>
+                      <a:round/>
+                      <a:headEnd type="none" w="med" len="med"/>
+                      <a:tailEnd type="none" w="med" len="med"/>
+                    </a:lnT>
+                    <a:lnB w="12700" cap="flat" cmpd="sng" algn="ctr">
+                      <a:solidFill>
+                        <a:schemeClr val="tx1"/>
+                      </a:solidFill>
+                      <a:prstDash val="solid"/>
+                      <a:round/>
+                      <a:headEnd type="none" w="med" len="med"/>
+                      <a:tailEnd type="none" w="med" len="med"/>
+                    </a:lnB>
+                    <a:lnTlToBr w="12700" cmpd="sng">
+                      <a:noFill/>
+                      <a:prstDash val="solid"/>
+                    </a:lnTlToBr>
+                    <a:lnBlToTr w="12700" cmpd="sng">
+                      <a:noFill/>
+                      <a:prstDash val="solid"/>
+                    </a:lnBlToTr>
+                    <a:solidFill>
+                      <a:schemeClr val="bg1"/>
+                    </a:solidFill>
+                  </a:tcPr>
+                </a:tc>
+                <a:extLst>
+                  <a:ext uri="{0D108BD9-81ED-4DB2-BD59-A6C34878D82A}">
+                    <a16:rowId xmlns:a16="http://schemas.microsoft.com/office/drawing/2014/main" val="3093163206"/>
+                  </a:ext>
+                </a:extLst>
+              </a:tr>
+              <a:tr h="581669">
+                <a:tc>
+                  <a:txBody>
+                    <a:bodyPr/>
+                    <a:lstStyle/>
+                    <a:p>
+                      <a:pPr marL="0" marR="0">
+                        <a:lnSpc>
+                          <a:spcPct val="107000"/>
+                        </a:lnSpc>
+                        <a:spcBef>
+                          <a:spcPts val="0"/>
+                        </a:spcBef>
+                        <a:spcAft>
+                          <a:spcPts val="800"/>
+                        </a:spcAft>
+                      </a:pPr>
+                      <a:r>
+                        <a:rPr lang="en-US" sz="1600" dirty="0">
+                          <a:effectLst/>
+                        </a:rPr>
+                        <a:t>Monday</a:t>
+                      </a:r>
+                      <a:endParaRPr lang="en-US" sz="1600" dirty="0">
+                        <a:effectLst/>
+                        <a:latin typeface="Calibri" panose="020F0502020204030204" pitchFamily="34" charset="0"/>
+                        <a:ea typeface="Calibri" panose="020F0502020204030204" pitchFamily="34" charset="0"/>
+                        <a:cs typeface="Times New Roman" panose="02020603050405020304" pitchFamily="18" charset="0"/>
+                      </a:endParaRPr>
+                    </a:p>
+                  </a:txBody>
+                  <a:tcPr marL="15875" marR="15875" marT="15875" marB="15875" anchor="ctr">
+                    <a:lnL w="12700" cap="flat" cmpd="sng" algn="ctr">
+                      <a:solidFill>
+                        <a:schemeClr val="tx1"/>
+                      </a:solidFill>
+                      <a:prstDash val="solid"/>
+                      <a:round/>
+                      <a:headEnd type="none" w="med" len="med"/>
+                      <a:tailEnd type="none" w="med" len="med"/>
+                    </a:lnL>
+                    <a:lnR w="12700" cap="flat" cmpd="sng" algn="ctr">
+                      <a:solidFill>
+                        <a:schemeClr val="tx1"/>
+                      </a:solidFill>
+                      <a:prstDash val="solid"/>
+                      <a:round/>
+                      <a:headEnd type="none" w="med" len="med"/>
+                      <a:tailEnd type="none" w="med" len="med"/>
+                    </a:lnR>
+                    <a:lnT w="12700" cap="flat" cmpd="sng" algn="ctr">
+                      <a:solidFill>
+                        <a:schemeClr val="tx1"/>
+                      </a:solidFill>
+                      <a:prstDash val="solid"/>
+                      <a:round/>
+                      <a:headEnd type="none" w="med" len="med"/>
+                      <a:tailEnd type="none" w="med" len="med"/>
+                    </a:lnT>
+                    <a:lnB w="12700" cap="flat" cmpd="sng" algn="ctr">
+                      <a:solidFill>
+                        <a:schemeClr val="tx1"/>
+                      </a:solidFill>
+                      <a:prstDash val="solid"/>
+                      <a:round/>
+                      <a:headEnd type="none" w="med" len="med"/>
+                      <a:tailEnd type="none" w="med" len="med"/>
+                    </a:lnB>
+                    <a:lnTlToBr w="12700" cmpd="sng">
+                      <a:noFill/>
+                      <a:prstDash val="solid"/>
+                    </a:lnTlToBr>
+                    <a:lnBlToTr w="12700" cmpd="sng">
+                      <a:noFill/>
+                      <a:prstDash val="solid"/>
+                    </a:lnBlToTr>
+                    <a:solidFill>
+                      <a:schemeClr val="bg1"/>
+                    </a:solidFill>
+                  </a:tcPr>
+                </a:tc>
+                <a:tc>
+                  <a:txBody>
+                    <a:bodyPr/>
+                    <a:lstStyle/>
+                    <a:p>
+                      <a:pPr marL="0" marR="0">
+                        <a:lnSpc>
+                          <a:spcPct val="107000"/>
+                        </a:lnSpc>
+                        <a:spcBef>
+                          <a:spcPts val="0"/>
+                        </a:spcBef>
+                        <a:spcAft>
+                          <a:spcPts val="800"/>
+                        </a:spcAft>
+                      </a:pPr>
+                      <a:r>
+                        <a:rPr lang="en-US" sz="1600" dirty="0">
+                          <a:effectLst/>
+                        </a:rPr>
+                        <a:t>12 PM - 2 PM : CSB 120</a:t>
+                      </a:r>
+                      <a:endParaRPr lang="en-US" sz="1600" dirty="0">
+                        <a:effectLst/>
+                        <a:latin typeface="Calibri" panose="020F0502020204030204" pitchFamily="34" charset="0"/>
+                        <a:ea typeface="Calibri" panose="020F0502020204030204" pitchFamily="34" charset="0"/>
+                        <a:cs typeface="Times New Roman" panose="02020603050405020304" pitchFamily="18" charset="0"/>
+                      </a:endParaRPr>
+                    </a:p>
+                  </a:txBody>
+                  <a:tcPr marL="15875" marR="15875" marT="15875" marB="15875" anchor="ctr">
+                    <a:lnL w="12700" cap="flat" cmpd="sng" algn="ctr">
+                      <a:solidFill>
+                        <a:schemeClr val="tx1"/>
+                      </a:solidFill>
+                      <a:prstDash val="solid"/>
+                      <a:round/>
+                      <a:headEnd type="none" w="med" len="med"/>
+                      <a:tailEnd type="none" w="med" len="med"/>
+                    </a:lnL>
+                    <a:lnR w="12700" cap="flat" cmpd="sng" algn="ctr">
+                      <a:solidFill>
+                        <a:schemeClr val="tx1"/>
+                      </a:solidFill>
+                      <a:prstDash val="solid"/>
+                      <a:round/>
+                      <a:headEnd type="none" w="med" len="med"/>
+                      <a:tailEnd type="none" w="med" len="med"/>
+                    </a:lnR>
+                    <a:lnT w="12700" cap="flat" cmpd="sng" algn="ctr">
+                      <a:solidFill>
+                        <a:schemeClr val="tx1"/>
+                      </a:solidFill>
+                      <a:prstDash val="solid"/>
+                      <a:round/>
+                      <a:headEnd type="none" w="med" len="med"/>
+                      <a:tailEnd type="none" w="med" len="med"/>
+                    </a:lnT>
+                    <a:lnB w="12700" cap="flat" cmpd="sng" algn="ctr">
+                      <a:solidFill>
+                        <a:schemeClr val="tx1"/>
+                      </a:solidFill>
+                      <a:prstDash val="solid"/>
+                      <a:round/>
+                      <a:headEnd type="none" w="med" len="med"/>
+                      <a:tailEnd type="none" w="med" len="med"/>
+                    </a:lnB>
+                    <a:lnTlToBr w="12700" cmpd="sng">
+                      <a:noFill/>
+                      <a:prstDash val="solid"/>
+                    </a:lnTlToBr>
+                    <a:lnBlToTr w="12700" cmpd="sng">
+                      <a:noFill/>
+                      <a:prstDash val="solid"/>
+                    </a:lnBlToTr>
+                    <a:solidFill>
+                      <a:schemeClr val="bg1"/>
+                    </a:solidFill>
+                  </a:tcPr>
+                </a:tc>
+                <a:extLst>
+                  <a:ext uri="{0D108BD9-81ED-4DB2-BD59-A6C34878D82A}">
+                    <a16:rowId xmlns:a16="http://schemas.microsoft.com/office/drawing/2014/main" val="1139786997"/>
+                  </a:ext>
+                </a:extLst>
+              </a:tr>
+              <a:tr h="307347">
+                <a:tc>
+                  <a:txBody>
+                    <a:bodyPr/>
+                    <a:lstStyle/>
+                    <a:p>
+                      <a:pPr marL="0" marR="0">
+                        <a:lnSpc>
+                          <a:spcPct val="107000"/>
+                        </a:lnSpc>
+                        <a:spcBef>
+                          <a:spcPts val="0"/>
+                        </a:spcBef>
+                        <a:spcAft>
+                          <a:spcPts val="800"/>
+                        </a:spcAft>
+                      </a:pPr>
+                      <a:r>
+                        <a:rPr lang="en-US" sz="1600">
+                          <a:effectLst/>
+                        </a:rPr>
+                        <a:t>Tuesday</a:t>
+                      </a:r>
+                      <a:endParaRPr lang="en-US" sz="1600">
+                        <a:effectLst/>
+                        <a:latin typeface="Calibri" panose="020F0502020204030204" pitchFamily="34" charset="0"/>
+                        <a:ea typeface="Calibri" panose="020F0502020204030204" pitchFamily="34" charset="0"/>
+                        <a:cs typeface="Times New Roman" panose="02020603050405020304" pitchFamily="18" charset="0"/>
+                      </a:endParaRPr>
+                    </a:p>
+                  </a:txBody>
+                  <a:tcPr marL="15875" marR="15875" marT="15875" marB="15875" anchor="ctr">
+                    <a:lnL w="12700" cap="flat" cmpd="sng" algn="ctr">
+                      <a:solidFill>
+                        <a:schemeClr val="tx1"/>
+                      </a:solidFill>
+                      <a:prstDash val="solid"/>
+                      <a:round/>
+                      <a:headEnd type="none" w="med" len="med"/>
+                      <a:tailEnd type="none" w="med" len="med"/>
+                    </a:lnL>
+                    <a:lnR w="12700" cap="flat" cmpd="sng" algn="ctr">
+                      <a:solidFill>
+                        <a:schemeClr val="tx1"/>
+                      </a:solidFill>
+                      <a:prstDash val="solid"/>
+                      <a:round/>
+                      <a:headEnd type="none" w="med" len="med"/>
+                      <a:tailEnd type="none" w="med" len="med"/>
+                    </a:lnR>
+                    <a:lnT w="12700" cap="flat" cmpd="sng" algn="ctr">
+                      <a:solidFill>
+                        <a:schemeClr val="tx1"/>
+                      </a:solidFill>
+                      <a:prstDash val="solid"/>
+                      <a:round/>
+                      <a:headEnd type="none" w="med" len="med"/>
+                      <a:tailEnd type="none" w="med" len="med"/>
+                    </a:lnT>
+                    <a:lnB w="12700" cap="flat" cmpd="sng" algn="ctr">
+                      <a:solidFill>
+                        <a:schemeClr val="tx1"/>
+                      </a:solidFill>
+                      <a:prstDash val="solid"/>
+                      <a:round/>
+                      <a:headEnd type="none" w="med" len="med"/>
+                      <a:tailEnd type="none" w="med" len="med"/>
+                    </a:lnB>
+                    <a:lnTlToBr w="12700" cmpd="sng">
+                      <a:noFill/>
+                      <a:prstDash val="solid"/>
+                    </a:lnTlToBr>
+                    <a:lnBlToTr w="12700" cmpd="sng">
+                      <a:noFill/>
+                      <a:prstDash val="solid"/>
+                    </a:lnBlToTr>
+                    <a:solidFill>
+                      <a:schemeClr val="bg1"/>
+                    </a:solidFill>
+                  </a:tcPr>
+                </a:tc>
+                <a:tc>
+                  <a:txBody>
+                    <a:bodyPr/>
+                    <a:lstStyle/>
+                    <a:p>
+                      <a:pPr marL="0" marR="0">
+                        <a:lnSpc>
+                          <a:spcPct val="107000"/>
+                        </a:lnSpc>
+                        <a:spcBef>
+                          <a:spcPts val="0"/>
+                        </a:spcBef>
+                        <a:spcAft>
+                          <a:spcPts val="800"/>
+                        </a:spcAft>
+                      </a:pPr>
+                      <a:r>
+                        <a:rPr lang="en-US" sz="1600">
+                          <a:effectLst/>
+                        </a:rPr>
+                        <a:t>6 PM - 8 PM : Teams</a:t>
+                      </a:r>
+                      <a:endParaRPr lang="en-US" sz="1600">
+                        <a:effectLst/>
+                        <a:latin typeface="Calibri" panose="020F0502020204030204" pitchFamily="34" charset="0"/>
+                        <a:ea typeface="Calibri" panose="020F0502020204030204" pitchFamily="34" charset="0"/>
+                        <a:cs typeface="Times New Roman" panose="02020603050405020304" pitchFamily="18" charset="0"/>
+                      </a:endParaRPr>
+                    </a:p>
+                  </a:txBody>
+                  <a:tcPr marL="15875" marR="15875" marT="15875" marB="15875" anchor="ctr">
+                    <a:lnL w="12700" cap="flat" cmpd="sng" algn="ctr">
+                      <a:solidFill>
+                        <a:schemeClr val="tx1"/>
+                      </a:solidFill>
+                      <a:prstDash val="solid"/>
+                      <a:round/>
+                      <a:headEnd type="none" w="med" len="med"/>
+                      <a:tailEnd type="none" w="med" len="med"/>
+                    </a:lnL>
+                    <a:lnR w="12700" cap="flat" cmpd="sng" algn="ctr">
+                      <a:solidFill>
+                        <a:schemeClr val="tx1"/>
+                      </a:solidFill>
+                      <a:prstDash val="solid"/>
+                      <a:round/>
+                      <a:headEnd type="none" w="med" len="med"/>
+                      <a:tailEnd type="none" w="med" len="med"/>
+                    </a:lnR>
+                    <a:lnT w="12700" cap="flat" cmpd="sng" algn="ctr">
+                      <a:solidFill>
+                        <a:schemeClr val="tx1"/>
+                      </a:solidFill>
+                      <a:prstDash val="solid"/>
+                      <a:round/>
+                      <a:headEnd type="none" w="med" len="med"/>
+                      <a:tailEnd type="none" w="med" len="med"/>
+                    </a:lnT>
+                    <a:lnB w="12700" cap="flat" cmpd="sng" algn="ctr">
+                      <a:solidFill>
+                        <a:schemeClr val="tx1"/>
+                      </a:solidFill>
+                      <a:prstDash val="solid"/>
+                      <a:round/>
+                      <a:headEnd type="none" w="med" len="med"/>
+                      <a:tailEnd type="none" w="med" len="med"/>
+                    </a:lnB>
+                    <a:lnTlToBr w="12700" cmpd="sng">
+                      <a:noFill/>
+                      <a:prstDash val="solid"/>
+                    </a:lnTlToBr>
+                    <a:lnBlToTr w="12700" cmpd="sng">
+                      <a:noFill/>
+                      <a:prstDash val="solid"/>
+                    </a:lnBlToTr>
+                    <a:solidFill>
+                      <a:schemeClr val="bg1"/>
+                    </a:solidFill>
+                  </a:tcPr>
+                </a:tc>
+                <a:extLst>
+                  <a:ext uri="{0D108BD9-81ED-4DB2-BD59-A6C34878D82A}">
+                    <a16:rowId xmlns:a16="http://schemas.microsoft.com/office/drawing/2014/main" val="1164388044"/>
+                  </a:ext>
+                </a:extLst>
+              </a:tr>
+              <a:tr h="581669">
+                <a:tc>
+                  <a:txBody>
+                    <a:bodyPr/>
+                    <a:lstStyle/>
+                    <a:p>
+                      <a:pPr marL="0" marR="0">
+                        <a:lnSpc>
+                          <a:spcPct val="107000"/>
+                        </a:lnSpc>
+                        <a:spcBef>
+                          <a:spcPts val="0"/>
+                        </a:spcBef>
+                        <a:spcAft>
+                          <a:spcPts val="800"/>
+                        </a:spcAft>
+                      </a:pPr>
+                      <a:r>
+                        <a:rPr lang="en-US" sz="1600">
+                          <a:effectLst/>
+                        </a:rPr>
+                        <a:t>Wednesday</a:t>
+                      </a:r>
+                      <a:endParaRPr lang="en-US" sz="1600">
+                        <a:effectLst/>
+                        <a:latin typeface="Calibri" panose="020F0502020204030204" pitchFamily="34" charset="0"/>
+                        <a:ea typeface="Calibri" panose="020F0502020204030204" pitchFamily="34" charset="0"/>
+                        <a:cs typeface="Times New Roman" panose="02020603050405020304" pitchFamily="18" charset="0"/>
+                      </a:endParaRPr>
+                    </a:p>
+                  </a:txBody>
+                  <a:tcPr marL="15875" marR="15875" marT="15875" marB="15875" anchor="ctr">
+                    <a:lnL w="12700" cap="flat" cmpd="sng" algn="ctr">
+                      <a:solidFill>
+                        <a:schemeClr val="tx1"/>
+                      </a:solidFill>
+                      <a:prstDash val="solid"/>
+                      <a:round/>
+                      <a:headEnd type="none" w="med" len="med"/>
+                      <a:tailEnd type="none" w="med" len="med"/>
+                    </a:lnL>
+                    <a:lnR w="12700" cap="flat" cmpd="sng" algn="ctr">
+                      <a:solidFill>
+                        <a:schemeClr val="tx1"/>
+                      </a:solidFill>
+                      <a:prstDash val="solid"/>
+                      <a:round/>
+                      <a:headEnd type="none" w="med" len="med"/>
+                      <a:tailEnd type="none" w="med" len="med"/>
+                    </a:lnR>
+                    <a:lnT w="12700" cap="flat" cmpd="sng" algn="ctr">
+                      <a:solidFill>
+                        <a:schemeClr val="tx1"/>
+                      </a:solidFill>
+                      <a:prstDash val="solid"/>
+                      <a:round/>
+                      <a:headEnd type="none" w="med" len="med"/>
+                      <a:tailEnd type="none" w="med" len="med"/>
+                    </a:lnT>
+                    <a:lnB w="12700" cap="flat" cmpd="sng" algn="ctr">
+                      <a:solidFill>
+                        <a:schemeClr val="tx1"/>
+                      </a:solidFill>
+                      <a:prstDash val="solid"/>
+                      <a:round/>
+                      <a:headEnd type="none" w="med" len="med"/>
+                      <a:tailEnd type="none" w="med" len="med"/>
+                    </a:lnB>
+                    <a:lnTlToBr w="12700" cmpd="sng">
+                      <a:noFill/>
+                      <a:prstDash val="solid"/>
+                    </a:lnTlToBr>
+                    <a:lnBlToTr w="12700" cmpd="sng">
+                      <a:noFill/>
+                      <a:prstDash val="solid"/>
+                    </a:lnBlToTr>
+                    <a:solidFill>
+                      <a:schemeClr val="bg1"/>
+                    </a:solidFill>
+                  </a:tcPr>
+                </a:tc>
+                <a:tc>
+                  <a:txBody>
+                    <a:bodyPr/>
+                    <a:lstStyle/>
+                    <a:p>
+                      <a:pPr marL="0" marR="0">
+                        <a:lnSpc>
+                          <a:spcPct val="107000"/>
+                        </a:lnSpc>
+                        <a:spcBef>
+                          <a:spcPts val="0"/>
+                        </a:spcBef>
+                        <a:spcAft>
+                          <a:spcPts val="800"/>
+                        </a:spcAft>
+                      </a:pPr>
+                      <a:r>
+                        <a:rPr lang="en-US" sz="1600">
+                          <a:effectLst/>
+                        </a:rPr>
+                        <a:t>3 PM - 5 PM : CSB 120</a:t>
+                      </a:r>
+                      <a:endParaRPr lang="en-US" sz="1600">
+                        <a:effectLst/>
+                        <a:latin typeface="Calibri" panose="020F0502020204030204" pitchFamily="34" charset="0"/>
+                        <a:ea typeface="Calibri" panose="020F0502020204030204" pitchFamily="34" charset="0"/>
+                        <a:cs typeface="Times New Roman" panose="02020603050405020304" pitchFamily="18" charset="0"/>
+                      </a:endParaRPr>
+                    </a:p>
+                  </a:txBody>
+                  <a:tcPr marL="15875" marR="15875" marT="15875" marB="15875" anchor="ctr">
+                    <a:lnL w="12700" cap="flat" cmpd="sng" algn="ctr">
+                      <a:solidFill>
+                        <a:schemeClr val="tx1"/>
+                      </a:solidFill>
+                      <a:prstDash val="solid"/>
+                      <a:round/>
+                      <a:headEnd type="none" w="med" len="med"/>
+                      <a:tailEnd type="none" w="med" len="med"/>
+                    </a:lnL>
+                    <a:lnR w="12700" cap="flat" cmpd="sng" algn="ctr">
+                      <a:solidFill>
+                        <a:schemeClr val="tx1"/>
+                      </a:solidFill>
+                      <a:prstDash val="solid"/>
+                      <a:round/>
+                      <a:headEnd type="none" w="med" len="med"/>
+                      <a:tailEnd type="none" w="med" len="med"/>
+                    </a:lnR>
+                    <a:lnT w="12700" cap="flat" cmpd="sng" algn="ctr">
+                      <a:solidFill>
+                        <a:schemeClr val="tx1"/>
+                      </a:solidFill>
+                      <a:prstDash val="solid"/>
+                      <a:round/>
+                      <a:headEnd type="none" w="med" len="med"/>
+                      <a:tailEnd type="none" w="med" len="med"/>
+                    </a:lnT>
+                    <a:lnB w="12700" cap="flat" cmpd="sng" algn="ctr">
+                      <a:solidFill>
+                        <a:schemeClr val="tx1"/>
+                      </a:solidFill>
+                      <a:prstDash val="solid"/>
+                      <a:round/>
+                      <a:headEnd type="none" w="med" len="med"/>
+                      <a:tailEnd type="none" w="med" len="med"/>
+                    </a:lnB>
+                    <a:lnTlToBr w="12700" cmpd="sng">
+                      <a:noFill/>
+                      <a:prstDash val="solid"/>
+                    </a:lnTlToBr>
+                    <a:lnBlToTr w="12700" cmpd="sng">
+                      <a:noFill/>
+                      <a:prstDash val="solid"/>
+                    </a:lnBlToTr>
+                    <a:solidFill>
+                      <a:schemeClr val="bg1"/>
+                    </a:solidFill>
+                  </a:tcPr>
+                </a:tc>
+                <a:extLst>
+                  <a:ext uri="{0D108BD9-81ED-4DB2-BD59-A6C34878D82A}">
+                    <a16:rowId xmlns:a16="http://schemas.microsoft.com/office/drawing/2014/main" val="1097778555"/>
+                  </a:ext>
+                </a:extLst>
+              </a:tr>
+              <a:tr h="307347">
+                <a:tc>
+                  <a:txBody>
+                    <a:bodyPr/>
+                    <a:lstStyle/>
+                    <a:p>
+                      <a:pPr marL="0" marR="0">
+                        <a:lnSpc>
+                          <a:spcPct val="107000"/>
+                        </a:lnSpc>
+                        <a:spcBef>
+                          <a:spcPts val="0"/>
+                        </a:spcBef>
+                        <a:spcAft>
+                          <a:spcPts val="800"/>
+                        </a:spcAft>
+                      </a:pPr>
+                      <a:r>
+                        <a:rPr lang="en-US" sz="1600">
+                          <a:effectLst/>
+                        </a:rPr>
+                        <a:t>Thursday</a:t>
+                      </a:r>
+                      <a:endParaRPr lang="en-US" sz="1600">
+                        <a:effectLst/>
+                        <a:latin typeface="Calibri" panose="020F0502020204030204" pitchFamily="34" charset="0"/>
+                        <a:ea typeface="Calibri" panose="020F0502020204030204" pitchFamily="34" charset="0"/>
+                        <a:cs typeface="Times New Roman" panose="02020603050405020304" pitchFamily="18" charset="0"/>
+                      </a:endParaRPr>
+                    </a:p>
+                  </a:txBody>
+                  <a:tcPr marL="15875" marR="15875" marT="15875" marB="15875" anchor="ctr">
+                    <a:lnL w="12700" cap="flat" cmpd="sng" algn="ctr">
+                      <a:solidFill>
+                        <a:schemeClr val="tx1"/>
+                      </a:solidFill>
+                      <a:prstDash val="solid"/>
+                      <a:round/>
+                      <a:headEnd type="none" w="med" len="med"/>
+                      <a:tailEnd type="none" w="med" len="med"/>
+                    </a:lnL>
+                    <a:lnR w="12700" cap="flat" cmpd="sng" algn="ctr">
+                      <a:solidFill>
+                        <a:schemeClr val="tx1"/>
+                      </a:solidFill>
+                      <a:prstDash val="solid"/>
+                      <a:round/>
+                      <a:headEnd type="none" w="med" len="med"/>
+                      <a:tailEnd type="none" w="med" len="med"/>
+                    </a:lnR>
+                    <a:lnT w="12700" cap="flat" cmpd="sng" algn="ctr">
+                      <a:solidFill>
+                        <a:schemeClr val="tx1"/>
+                      </a:solidFill>
+                      <a:prstDash val="solid"/>
+                      <a:round/>
+                      <a:headEnd type="none" w="med" len="med"/>
+                      <a:tailEnd type="none" w="med" len="med"/>
+                    </a:lnT>
+                    <a:lnB w="12700" cap="flat" cmpd="sng" algn="ctr">
+                      <a:solidFill>
+                        <a:schemeClr val="tx1"/>
+                      </a:solidFill>
+                      <a:prstDash val="solid"/>
+                      <a:round/>
+                      <a:headEnd type="none" w="med" len="med"/>
+                      <a:tailEnd type="none" w="med" len="med"/>
+                    </a:lnB>
+                    <a:lnTlToBr w="12700" cmpd="sng">
+                      <a:noFill/>
+                      <a:prstDash val="solid"/>
+                    </a:lnTlToBr>
+                    <a:lnBlToTr w="12700" cmpd="sng">
+                      <a:noFill/>
+                      <a:prstDash val="solid"/>
+                    </a:lnBlToTr>
+                    <a:solidFill>
+                      <a:schemeClr val="bg1"/>
+                    </a:solidFill>
+                  </a:tcPr>
+                </a:tc>
+                <a:tc>
+                  <a:txBody>
+                    <a:bodyPr/>
+                    <a:lstStyle/>
+                    <a:p>
+                      <a:pPr marL="0" marR="0">
+                        <a:lnSpc>
+                          <a:spcPct val="107000"/>
+                        </a:lnSpc>
+                        <a:spcBef>
+                          <a:spcPts val="0"/>
+                        </a:spcBef>
+                        <a:spcAft>
+                          <a:spcPts val="800"/>
+                        </a:spcAft>
+                      </a:pPr>
+                      <a:r>
+                        <a:rPr lang="en-US" sz="1600">
+                          <a:effectLst/>
+                        </a:rPr>
+                        <a:t>6 PM - 8 PM : Teams</a:t>
+                      </a:r>
+                      <a:endParaRPr lang="en-US" sz="1600">
+                        <a:effectLst/>
+                        <a:latin typeface="Calibri" panose="020F0502020204030204" pitchFamily="34" charset="0"/>
+                        <a:ea typeface="Calibri" panose="020F0502020204030204" pitchFamily="34" charset="0"/>
+                        <a:cs typeface="Times New Roman" panose="02020603050405020304" pitchFamily="18" charset="0"/>
+                      </a:endParaRPr>
+                    </a:p>
+                  </a:txBody>
+                  <a:tcPr marL="15875" marR="15875" marT="15875" marB="15875" anchor="ctr">
+                    <a:lnL w="12700" cap="flat" cmpd="sng" algn="ctr">
+                      <a:solidFill>
+                        <a:schemeClr val="tx1"/>
+                      </a:solidFill>
+                      <a:prstDash val="solid"/>
+                      <a:round/>
+                      <a:headEnd type="none" w="med" len="med"/>
+                      <a:tailEnd type="none" w="med" len="med"/>
+                    </a:lnL>
+                    <a:lnR w="12700" cap="flat" cmpd="sng" algn="ctr">
+                      <a:solidFill>
+                        <a:schemeClr val="tx1"/>
+                      </a:solidFill>
+                      <a:prstDash val="solid"/>
+                      <a:round/>
+                      <a:headEnd type="none" w="med" len="med"/>
+                      <a:tailEnd type="none" w="med" len="med"/>
+                    </a:lnR>
+                    <a:lnT w="12700" cap="flat" cmpd="sng" algn="ctr">
+                      <a:solidFill>
+                        <a:schemeClr val="tx1"/>
+                      </a:solidFill>
+                      <a:prstDash val="solid"/>
+                      <a:round/>
+                      <a:headEnd type="none" w="med" len="med"/>
+                      <a:tailEnd type="none" w="med" len="med"/>
+                    </a:lnT>
+                    <a:lnB w="12700" cap="flat" cmpd="sng" algn="ctr">
+                      <a:solidFill>
+                        <a:schemeClr val="tx1"/>
+                      </a:solidFill>
+                      <a:prstDash val="solid"/>
+                      <a:round/>
+                      <a:headEnd type="none" w="med" len="med"/>
+                      <a:tailEnd type="none" w="med" len="med"/>
+                    </a:lnB>
+                    <a:lnTlToBr w="12700" cmpd="sng">
+                      <a:noFill/>
+                      <a:prstDash val="solid"/>
+                    </a:lnTlToBr>
+                    <a:lnBlToTr w="12700" cmpd="sng">
+                      <a:noFill/>
+                      <a:prstDash val="solid"/>
+                    </a:lnBlToTr>
+                    <a:solidFill>
+                      <a:schemeClr val="bg1"/>
+                    </a:solidFill>
+                  </a:tcPr>
+                </a:tc>
+                <a:extLst>
+                  <a:ext uri="{0D108BD9-81ED-4DB2-BD59-A6C34878D82A}">
+                    <a16:rowId xmlns:a16="http://schemas.microsoft.com/office/drawing/2014/main" val="1747960062"/>
+                  </a:ext>
+                </a:extLst>
+              </a:tr>
+              <a:tr h="581669">
+                <a:tc>
+                  <a:txBody>
+                    <a:bodyPr/>
+                    <a:lstStyle/>
+                    <a:p>
+                      <a:pPr marL="0" marR="0">
+                        <a:lnSpc>
+                          <a:spcPct val="107000"/>
+                        </a:lnSpc>
+                        <a:spcBef>
+                          <a:spcPts val="0"/>
+                        </a:spcBef>
+                        <a:spcAft>
+                          <a:spcPts val="800"/>
+                        </a:spcAft>
+                      </a:pPr>
+                      <a:r>
+                        <a:rPr lang="en-US" sz="1600">
+                          <a:effectLst/>
+                        </a:rPr>
+                        <a:t>Friday</a:t>
+                      </a:r>
+                      <a:endParaRPr lang="en-US" sz="1600">
+                        <a:effectLst/>
+                        <a:latin typeface="Calibri" panose="020F0502020204030204" pitchFamily="34" charset="0"/>
+                        <a:ea typeface="Calibri" panose="020F0502020204030204" pitchFamily="34" charset="0"/>
+                        <a:cs typeface="Times New Roman" panose="02020603050405020304" pitchFamily="18" charset="0"/>
+                      </a:endParaRPr>
+                    </a:p>
+                  </a:txBody>
+                  <a:tcPr marL="15875" marR="15875" marT="15875" marB="15875" anchor="ctr">
+                    <a:lnL w="12700" cap="flat" cmpd="sng" algn="ctr">
+                      <a:solidFill>
+                        <a:schemeClr val="tx1"/>
+                      </a:solidFill>
+                      <a:prstDash val="solid"/>
+                      <a:round/>
+                      <a:headEnd type="none" w="med" len="med"/>
+                      <a:tailEnd type="none" w="med" len="med"/>
+                    </a:lnL>
+                    <a:lnR w="12700" cap="flat" cmpd="sng" algn="ctr">
+                      <a:solidFill>
+                        <a:schemeClr val="tx1"/>
+                      </a:solidFill>
+                      <a:prstDash val="solid"/>
+                      <a:round/>
+                      <a:headEnd type="none" w="med" len="med"/>
+                      <a:tailEnd type="none" w="med" len="med"/>
+                    </a:lnR>
+                    <a:lnT w="12700" cap="flat" cmpd="sng" algn="ctr">
+                      <a:solidFill>
+                        <a:schemeClr val="tx1"/>
+                      </a:solidFill>
+                      <a:prstDash val="solid"/>
+                      <a:round/>
+                      <a:headEnd type="none" w="med" len="med"/>
+                      <a:tailEnd type="none" w="med" len="med"/>
+                    </a:lnT>
+                    <a:lnB w="12700" cap="flat" cmpd="sng" algn="ctr">
+                      <a:solidFill>
+                        <a:schemeClr val="tx1"/>
+                      </a:solidFill>
+                      <a:prstDash val="solid"/>
+                      <a:round/>
+                      <a:headEnd type="none" w="med" len="med"/>
+                      <a:tailEnd type="none" w="med" len="med"/>
+                    </a:lnB>
+                    <a:lnTlToBr w="12700" cmpd="sng">
+                      <a:noFill/>
+                      <a:prstDash val="solid"/>
+                    </a:lnTlToBr>
+                    <a:lnBlToTr w="12700" cmpd="sng">
+                      <a:noFill/>
+                      <a:prstDash val="solid"/>
+                    </a:lnBlToTr>
+                    <a:solidFill>
+                      <a:schemeClr val="bg1"/>
+                    </a:solidFill>
+                  </a:tcPr>
+                </a:tc>
+                <a:tc>
+                  <a:txBody>
+                    <a:bodyPr/>
+                    <a:lstStyle/>
+                    <a:p>
+                      <a:pPr marL="0" marR="0">
+                        <a:lnSpc>
+                          <a:spcPct val="107000"/>
+                        </a:lnSpc>
+                        <a:spcBef>
+                          <a:spcPts val="0"/>
+                        </a:spcBef>
+                        <a:spcAft>
+                          <a:spcPts val="800"/>
+                        </a:spcAft>
+                      </a:pPr>
+                      <a:r>
+                        <a:rPr lang="en-US" sz="1600">
+                          <a:effectLst/>
+                        </a:rPr>
+                        <a:t>3 PM - 5 PM : CSB 120</a:t>
+                      </a:r>
+                      <a:endParaRPr lang="en-US" sz="1600">
+                        <a:effectLst/>
+                        <a:latin typeface="Calibri" panose="020F0502020204030204" pitchFamily="34" charset="0"/>
+                        <a:ea typeface="Calibri" panose="020F0502020204030204" pitchFamily="34" charset="0"/>
+                        <a:cs typeface="Times New Roman" panose="02020603050405020304" pitchFamily="18" charset="0"/>
+                      </a:endParaRPr>
+                    </a:p>
+                  </a:txBody>
+                  <a:tcPr marL="15875" marR="15875" marT="15875" marB="15875" anchor="ctr">
+                    <a:lnL w="12700" cap="flat" cmpd="sng" algn="ctr">
+                      <a:solidFill>
+                        <a:schemeClr val="tx1"/>
+                      </a:solidFill>
+                      <a:prstDash val="solid"/>
+                      <a:round/>
+                      <a:headEnd type="none" w="med" len="med"/>
+                      <a:tailEnd type="none" w="med" len="med"/>
+                    </a:lnL>
+                    <a:lnR w="12700" cap="flat" cmpd="sng" algn="ctr">
+                      <a:solidFill>
+                        <a:schemeClr val="tx1"/>
+                      </a:solidFill>
+                      <a:prstDash val="solid"/>
+                      <a:round/>
+                      <a:headEnd type="none" w="med" len="med"/>
+                      <a:tailEnd type="none" w="med" len="med"/>
+                    </a:lnR>
+                    <a:lnT w="12700" cap="flat" cmpd="sng" algn="ctr">
+                      <a:solidFill>
+                        <a:schemeClr val="tx1"/>
+                      </a:solidFill>
+                      <a:prstDash val="solid"/>
+                      <a:round/>
+                      <a:headEnd type="none" w="med" len="med"/>
+                      <a:tailEnd type="none" w="med" len="med"/>
+                    </a:lnT>
+                    <a:lnB w="12700" cap="flat" cmpd="sng" algn="ctr">
+                      <a:solidFill>
+                        <a:schemeClr val="tx1"/>
+                      </a:solidFill>
+                      <a:prstDash val="solid"/>
+                      <a:round/>
+                      <a:headEnd type="none" w="med" len="med"/>
+                      <a:tailEnd type="none" w="med" len="med"/>
+                    </a:lnB>
+                    <a:lnTlToBr w="12700" cmpd="sng">
+                      <a:noFill/>
+                      <a:prstDash val="solid"/>
+                    </a:lnTlToBr>
+                    <a:lnBlToTr w="12700" cmpd="sng">
+                      <a:noFill/>
+                      <a:prstDash val="solid"/>
+                    </a:lnBlToTr>
+                    <a:solidFill>
+                      <a:schemeClr val="bg1"/>
+                    </a:solidFill>
+                  </a:tcPr>
+                </a:tc>
+                <a:extLst>
+                  <a:ext uri="{0D108BD9-81ED-4DB2-BD59-A6C34878D82A}">
+                    <a16:rowId xmlns:a16="http://schemas.microsoft.com/office/drawing/2014/main" val="1553865624"/>
+                  </a:ext>
+                </a:extLst>
+              </a:tr>
+              <a:tr h="307347">
+                <a:tc>
+                  <a:txBody>
+                    <a:bodyPr/>
+                    <a:lstStyle/>
+                    <a:p>
+                      <a:pPr marL="0" marR="0">
+                        <a:lnSpc>
+                          <a:spcPct val="107000"/>
+                        </a:lnSpc>
+                        <a:spcBef>
+                          <a:spcPts val="0"/>
+                        </a:spcBef>
+                        <a:spcAft>
+                          <a:spcPts val="800"/>
+                        </a:spcAft>
+                      </a:pPr>
+                      <a:r>
+                        <a:rPr lang="en-US" sz="1600">
+                          <a:effectLst/>
+                        </a:rPr>
+                        <a:t>Saturday</a:t>
+                      </a:r>
+                      <a:endParaRPr lang="en-US" sz="1600">
+                        <a:effectLst/>
+                        <a:latin typeface="Calibri" panose="020F0502020204030204" pitchFamily="34" charset="0"/>
+                        <a:ea typeface="Calibri" panose="020F0502020204030204" pitchFamily="34" charset="0"/>
+                        <a:cs typeface="Times New Roman" panose="02020603050405020304" pitchFamily="18" charset="0"/>
+                      </a:endParaRPr>
+                    </a:p>
+                  </a:txBody>
+                  <a:tcPr marL="15875" marR="15875" marT="15875" marB="15875" anchor="ctr">
+                    <a:lnL w="12700" cap="flat" cmpd="sng" algn="ctr">
+                      <a:solidFill>
+                        <a:schemeClr val="tx1"/>
+                      </a:solidFill>
+                      <a:prstDash val="solid"/>
+                      <a:round/>
+                      <a:headEnd type="none" w="med" len="med"/>
+                      <a:tailEnd type="none" w="med" len="med"/>
+                    </a:lnL>
+                    <a:lnR w="12700" cap="flat" cmpd="sng" algn="ctr">
+                      <a:solidFill>
+                        <a:schemeClr val="tx1"/>
+                      </a:solidFill>
+                      <a:prstDash val="solid"/>
+                      <a:round/>
+                      <a:headEnd type="none" w="med" len="med"/>
+                      <a:tailEnd type="none" w="med" len="med"/>
+                    </a:lnR>
+                    <a:lnT w="12700" cap="flat" cmpd="sng" algn="ctr">
+                      <a:solidFill>
+                        <a:schemeClr val="tx1"/>
+                      </a:solidFill>
+                      <a:prstDash val="solid"/>
+                      <a:round/>
+                      <a:headEnd type="none" w="med" len="med"/>
+                      <a:tailEnd type="none" w="med" len="med"/>
+                    </a:lnT>
+                    <a:lnB w="12700" cap="flat" cmpd="sng" algn="ctr">
+                      <a:solidFill>
+                        <a:schemeClr val="tx1"/>
+                      </a:solidFill>
+                      <a:prstDash val="solid"/>
+                      <a:round/>
+                      <a:headEnd type="none" w="med" len="med"/>
+                      <a:tailEnd type="none" w="med" len="med"/>
+                    </a:lnB>
+                    <a:lnTlToBr w="12700" cmpd="sng">
+                      <a:noFill/>
+                      <a:prstDash val="solid"/>
+                    </a:lnTlToBr>
+                    <a:lnBlToTr w="12700" cmpd="sng">
+                      <a:noFill/>
+                      <a:prstDash val="solid"/>
+                    </a:lnBlToTr>
+                    <a:solidFill>
+                      <a:schemeClr val="bg1"/>
+                    </a:solidFill>
+                  </a:tcPr>
+                </a:tc>
+                <a:tc>
+                  <a:txBody>
+                    <a:bodyPr/>
+                    <a:lstStyle/>
+                    <a:p>
+                      <a:pPr marL="0" marR="0">
+                        <a:lnSpc>
+                          <a:spcPct val="107000"/>
+                        </a:lnSpc>
+                        <a:spcBef>
+                          <a:spcPts val="0"/>
+                        </a:spcBef>
+                        <a:spcAft>
+                          <a:spcPts val="800"/>
+                        </a:spcAft>
+                      </a:pPr>
+                      <a:r>
+                        <a:rPr lang="en-US" sz="1600" dirty="0">
+                          <a:effectLst/>
+                        </a:rPr>
+                        <a:t>12 PM - 4 PM : Teams</a:t>
+                      </a:r>
+                      <a:endParaRPr lang="en-US" sz="1600" dirty="0">
+                        <a:effectLst/>
+                        <a:latin typeface="Calibri" panose="020F0502020204030204" pitchFamily="34" charset="0"/>
+                        <a:ea typeface="Calibri" panose="020F0502020204030204" pitchFamily="34" charset="0"/>
+                        <a:cs typeface="Times New Roman" panose="02020603050405020304" pitchFamily="18" charset="0"/>
+                      </a:endParaRPr>
+                    </a:p>
+                  </a:txBody>
+                  <a:tcPr marL="15875" marR="15875" marT="15875" marB="15875" anchor="ctr">
+                    <a:lnL w="12700" cap="flat" cmpd="sng" algn="ctr">
+                      <a:solidFill>
+                        <a:schemeClr val="tx1"/>
+                      </a:solidFill>
+                      <a:prstDash val="solid"/>
+                      <a:round/>
+                      <a:headEnd type="none" w="med" len="med"/>
+                      <a:tailEnd type="none" w="med" len="med"/>
+                    </a:lnL>
+                    <a:lnR w="12700" cap="flat" cmpd="sng" algn="ctr">
+                      <a:solidFill>
+                        <a:schemeClr val="tx1"/>
+                      </a:solidFill>
+                      <a:prstDash val="solid"/>
+                      <a:round/>
+                      <a:headEnd type="none" w="med" len="med"/>
+                      <a:tailEnd type="none" w="med" len="med"/>
+                    </a:lnR>
+                    <a:lnT w="12700" cap="flat" cmpd="sng" algn="ctr">
+                      <a:solidFill>
+                        <a:schemeClr val="tx1"/>
+                      </a:solidFill>
+                      <a:prstDash val="solid"/>
+                      <a:round/>
+                      <a:headEnd type="none" w="med" len="med"/>
+                      <a:tailEnd type="none" w="med" len="med"/>
+                    </a:lnT>
+                    <a:lnB w="12700" cap="flat" cmpd="sng" algn="ctr">
+                      <a:solidFill>
+                        <a:schemeClr val="tx1"/>
+                      </a:solidFill>
+                      <a:prstDash val="solid"/>
+                      <a:round/>
+                      <a:headEnd type="none" w="med" len="med"/>
+                      <a:tailEnd type="none" w="med" len="med"/>
+                    </a:lnB>
+                    <a:lnTlToBr w="12700" cmpd="sng">
+                      <a:noFill/>
+                      <a:prstDash val="solid"/>
+                    </a:lnTlToBr>
+                    <a:lnBlToTr w="12700" cmpd="sng">
+                      <a:noFill/>
+                      <a:prstDash val="solid"/>
+                    </a:lnBlToTr>
+                    <a:solidFill>
+                      <a:schemeClr val="bg1"/>
+                    </a:solidFill>
+                  </a:tcPr>
+                </a:tc>
+                <a:extLst>
+                  <a:ext uri="{0D108BD9-81ED-4DB2-BD59-A6C34878D82A}">
+                    <a16:rowId xmlns:a16="http://schemas.microsoft.com/office/drawing/2014/main" val="3921746368"/>
+                  </a:ext>
+                </a:extLst>
+              </a:tr>
+              <a:tr h="307347">
+                <a:tc>
+                  <a:txBody>
+                    <a:bodyPr/>
+                    <a:lstStyle/>
+                    <a:p>
+                      <a:pPr marL="0" marR="0">
+                        <a:lnSpc>
+                          <a:spcPct val="107000"/>
+                        </a:lnSpc>
+                        <a:spcBef>
+                          <a:spcPts val="0"/>
+                        </a:spcBef>
+                        <a:spcAft>
+                          <a:spcPts val="800"/>
+                        </a:spcAft>
+                      </a:pPr>
+                      <a:r>
+                        <a:rPr lang="en-US" sz="1600">
+                          <a:effectLst/>
+                        </a:rPr>
+                        <a:t>Sunday</a:t>
+                      </a:r>
+                      <a:endParaRPr lang="en-US" sz="1600">
+                        <a:effectLst/>
+                        <a:latin typeface="Calibri" panose="020F0502020204030204" pitchFamily="34" charset="0"/>
+                        <a:ea typeface="Calibri" panose="020F0502020204030204" pitchFamily="34" charset="0"/>
+                        <a:cs typeface="Times New Roman" panose="02020603050405020304" pitchFamily="18" charset="0"/>
+                      </a:endParaRPr>
+                    </a:p>
+                  </a:txBody>
+                  <a:tcPr marL="15875" marR="15875" marT="15875" marB="15875" anchor="ctr">
+                    <a:lnL w="12700" cap="flat" cmpd="sng" algn="ctr">
+                      <a:solidFill>
+                        <a:schemeClr val="tx1"/>
+                      </a:solidFill>
+                      <a:prstDash val="solid"/>
+                      <a:round/>
+                      <a:headEnd type="none" w="med" len="med"/>
+                      <a:tailEnd type="none" w="med" len="med"/>
+                    </a:lnL>
+                    <a:lnR w="12700" cap="flat" cmpd="sng" algn="ctr">
+                      <a:solidFill>
+                        <a:schemeClr val="tx1"/>
+                      </a:solidFill>
+                      <a:prstDash val="solid"/>
+                      <a:round/>
+                      <a:headEnd type="none" w="med" len="med"/>
+                      <a:tailEnd type="none" w="med" len="med"/>
+                    </a:lnR>
+                    <a:lnT w="12700" cap="flat" cmpd="sng" algn="ctr">
+                      <a:solidFill>
+                        <a:schemeClr val="tx1"/>
+                      </a:solidFill>
+                      <a:prstDash val="solid"/>
+                      <a:round/>
+                      <a:headEnd type="none" w="med" len="med"/>
+                      <a:tailEnd type="none" w="med" len="med"/>
+                    </a:lnT>
+                    <a:lnB w="12700" cap="flat" cmpd="sng" algn="ctr">
+                      <a:solidFill>
+                        <a:schemeClr val="tx1"/>
+                      </a:solidFill>
+                      <a:prstDash val="solid"/>
+                      <a:round/>
+                      <a:headEnd type="none" w="med" len="med"/>
+                      <a:tailEnd type="none" w="med" len="med"/>
+                    </a:lnB>
+                    <a:lnTlToBr w="12700" cmpd="sng">
+                      <a:noFill/>
+                      <a:prstDash val="solid"/>
+                    </a:lnTlToBr>
+                    <a:lnBlToTr w="12700" cmpd="sng">
+                      <a:noFill/>
+                      <a:prstDash val="solid"/>
+                    </a:lnBlToTr>
+                    <a:solidFill>
+                      <a:schemeClr val="bg1"/>
+                    </a:solidFill>
+                  </a:tcPr>
+                </a:tc>
+                <a:tc>
+                  <a:txBody>
+                    <a:bodyPr/>
+                    <a:lstStyle/>
+                    <a:p>
+                      <a:pPr marL="0" marR="0">
+                        <a:lnSpc>
+                          <a:spcPct val="107000"/>
+                        </a:lnSpc>
+                        <a:spcBef>
+                          <a:spcPts val="0"/>
+                        </a:spcBef>
+                        <a:spcAft>
+                          <a:spcPts val="800"/>
+                        </a:spcAft>
+                      </a:pPr>
+                      <a:r>
+                        <a:rPr lang="en-US" sz="1600" dirty="0">
+                          <a:effectLst/>
+                        </a:rPr>
+                        <a:t>12 PM - 4 PM : Teams</a:t>
+                      </a:r>
+                      <a:endParaRPr lang="en-US" sz="1600" dirty="0">
+                        <a:effectLst/>
+                        <a:latin typeface="Calibri" panose="020F0502020204030204" pitchFamily="34" charset="0"/>
+                        <a:ea typeface="Calibri" panose="020F0502020204030204" pitchFamily="34" charset="0"/>
+                        <a:cs typeface="Times New Roman" panose="02020603050405020304" pitchFamily="18" charset="0"/>
+                      </a:endParaRPr>
+                    </a:p>
+                  </a:txBody>
+                  <a:tcPr marL="15875" marR="15875" marT="15875" marB="15875" anchor="ctr">
+                    <a:lnL w="12700" cap="flat" cmpd="sng" algn="ctr">
+                      <a:solidFill>
+                        <a:schemeClr val="tx1"/>
+                      </a:solidFill>
+                      <a:prstDash val="solid"/>
+                      <a:round/>
+                      <a:headEnd type="none" w="med" len="med"/>
+                      <a:tailEnd type="none" w="med" len="med"/>
+                    </a:lnL>
+                    <a:lnR w="12700" cap="flat" cmpd="sng" algn="ctr">
+                      <a:solidFill>
+                        <a:schemeClr val="tx1"/>
+                      </a:solidFill>
+                      <a:prstDash val="solid"/>
+                      <a:round/>
+                      <a:headEnd type="none" w="med" len="med"/>
+                      <a:tailEnd type="none" w="med" len="med"/>
+                    </a:lnR>
+                    <a:lnT w="12700" cap="flat" cmpd="sng" algn="ctr">
+                      <a:solidFill>
+                        <a:schemeClr val="tx1"/>
+                      </a:solidFill>
+                      <a:prstDash val="solid"/>
+                      <a:round/>
+                      <a:headEnd type="none" w="med" len="med"/>
+                      <a:tailEnd type="none" w="med" len="med"/>
+                    </a:lnT>
+                    <a:lnB w="12700" cap="flat" cmpd="sng" algn="ctr">
+                      <a:solidFill>
+                        <a:schemeClr val="tx1"/>
+                      </a:solidFill>
+                      <a:prstDash val="solid"/>
+                      <a:round/>
+                      <a:headEnd type="none" w="med" len="med"/>
+                      <a:tailEnd type="none" w="med" len="med"/>
+                    </a:lnB>
+                    <a:lnTlToBr w="12700" cmpd="sng">
+                      <a:noFill/>
+                      <a:prstDash val="solid"/>
+                    </a:lnTlToBr>
+                    <a:lnBlToTr w="12700" cmpd="sng">
+                      <a:noFill/>
+                      <a:prstDash val="solid"/>
+                    </a:lnBlToTr>
+                    <a:solidFill>
+                      <a:schemeClr val="bg1"/>
+                    </a:solidFill>
+                  </a:tcPr>
+                </a:tc>
+                <a:extLst>
+                  <a:ext uri="{0D108BD9-81ED-4DB2-BD59-A6C34878D82A}">
+                    <a16:rowId xmlns:a16="http://schemas.microsoft.com/office/drawing/2014/main" val="1928039740"/>
+                  </a:ext>
+                </a:extLst>
+              </a:tr>
+            </a:tbl>
+          </a:graphicData>
+        </a:graphic>
+      </p:graphicFrame>
     </p:spTree>
     <p:extLst>
       <p:ext uri="{BB962C8B-B14F-4D97-AF65-F5344CB8AC3E}">
@@ -19064,20 +19947,20 @@
 </file>
 
 <file path=customXml/item2.xml><?xml version="1.0" encoding="utf-8"?>
+<p:properties xmlns:p="http://schemas.microsoft.com/office/2006/metadata/properties" xmlns:xsi="http://www.w3.org/2001/XMLSchema-instance" xmlns:pc="http://schemas.microsoft.com/office/infopath/2007/PartnerControls">
+  <documentManagement>
+    <_activity xmlns="92c41bee-f0ee-4aa6-9399-a35fbb883510" xsi:nil="true"/>
+  </documentManagement>
+</p:properties>
+</file>
+
+<file path=customXml/item3.xml><?xml version="1.0" encoding="utf-8"?>
 <?mso-contentType ?>
 <FormTemplates xmlns="http://schemas.microsoft.com/sharepoint/v3/contenttype/forms">
   <Display>DocumentLibraryForm</Display>
   <Edit>DocumentLibraryForm</Edit>
   <New>DocumentLibraryForm</New>
 </FormTemplates>
-</file>
-
-<file path=customXml/item3.xml><?xml version="1.0" encoding="utf-8"?>
-<p:properties xmlns:p="http://schemas.microsoft.com/office/2006/metadata/properties" xmlns:xsi="http://www.w3.org/2001/XMLSchema-instance" xmlns:pc="http://schemas.microsoft.com/office/infopath/2007/PartnerControls">
-  <documentManagement>
-    <_activity xmlns="92c41bee-f0ee-4aa6-9399-a35fbb883510" xsi:nil="true"/>
-  </documentManagement>
-</p:properties>
 </file>
 
 <file path=customXml/itemProps1.xml><?xml version="1.0" encoding="utf-8"?>
@@ -19100,26 +19983,26 @@
 </file>
 
 <file path=customXml/itemProps2.xml><?xml version="1.0" encoding="utf-8"?>
+<ds:datastoreItem xmlns:ds="http://schemas.openxmlformats.org/officeDocument/2006/customXml" ds:itemID="{04408E98-FD53-4752-B390-626386BBD724}">
+  <ds:schemaRefs>
+    <ds:schemaRef ds:uri="92c41bee-f0ee-4aa6-9399-a35fbb883510"/>
+    <ds:schemaRef ds:uri="http://schemas.microsoft.com/office/2006/documentManagement/types"/>
+    <ds:schemaRef ds:uri="http://schemas.openxmlformats.org/package/2006/metadata/core-properties"/>
+    <ds:schemaRef ds:uri="http://schemas.microsoft.com/office/2006/metadata/properties"/>
+    <ds:schemaRef ds:uri="http://purl.org/dc/elements/1.1/"/>
+    <ds:schemaRef ds:uri="http://schemas.microsoft.com/office/infopath/2007/PartnerControls"/>
+    <ds:schemaRef ds:uri="e06ed288-fd75-4b50-bbed-f5a5df88c31c"/>
+    <ds:schemaRef ds:uri="http://purl.org/dc/terms/"/>
+    <ds:schemaRef ds:uri="http://www.w3.org/XML/1998/namespace"/>
+    <ds:schemaRef ds:uri="http://purl.org/dc/dcmitype/"/>
+  </ds:schemaRefs>
+</ds:datastoreItem>
+</file>
+
+<file path=customXml/itemProps3.xml><?xml version="1.0" encoding="utf-8"?>
 <ds:datastoreItem xmlns:ds="http://schemas.openxmlformats.org/officeDocument/2006/customXml" ds:itemID="{4CBADBC1-621B-4EED-B3DE-D3AE3A093F17}">
   <ds:schemaRefs>
     <ds:schemaRef ds:uri="http://schemas.microsoft.com/sharepoint/v3/contenttype/forms"/>
   </ds:schemaRefs>
 </ds:datastoreItem>
-</file>
-
-<file path=customXml/itemProps3.xml><?xml version="1.0" encoding="utf-8"?>
-<ds:datastoreItem xmlns:ds="http://schemas.openxmlformats.org/officeDocument/2006/customXml" ds:itemID="{04408E98-FD53-4752-B390-626386BBD724}">
-  <ds:schemaRefs>
-    <ds:schemaRef ds:uri="92c41bee-f0ee-4aa6-9399-a35fbb883510"/>
-    <ds:schemaRef ds:uri="e06ed288-fd75-4b50-bbed-f5a5df88c31c"/>
-    <ds:schemaRef ds:uri="http://purl.org/dc/dcmitype/"/>
-    <ds:schemaRef ds:uri="http://schemas.microsoft.com/office/2006/documentManagement/types"/>
-    <ds:schemaRef ds:uri="http://purl.org/dc/terms/"/>
-    <ds:schemaRef ds:uri="http://www.w3.org/XML/1998/namespace"/>
-    <ds:schemaRef ds:uri="http://purl.org/dc/elements/1.1/"/>
-    <ds:schemaRef ds:uri="http://schemas.openxmlformats.org/package/2006/metadata/core-properties"/>
-    <ds:schemaRef ds:uri="http://schemas.microsoft.com/office/infopath/2007/PartnerControls"/>
-    <ds:schemaRef ds:uri="http://schemas.microsoft.com/office/2006/metadata/properties"/>
-  </ds:schemaRefs>
-</ds:datastoreItem>
 </file>
</xml_diff>

<commit_message>
More recursion lecture updated
</commit_message>
<xml_diff>
--- a/slides/On-Campus/13_01_More Recursion.pptx
+++ b/slides/On-Campus/13_01_More Recursion.pptx
@@ -147,6 +147,30 @@
 <file path=ppt/changesInfos/changesInfo1.xml><?xml version="1.0" encoding="utf-8"?>
 <pc:chgInfo xmlns:a="http://schemas.openxmlformats.org/drawingml/2006/main" xmlns:r="http://schemas.openxmlformats.org/officeDocument/2006/relationships" xmlns:ac="http://schemas.microsoft.com/office/drawing/2013/main/command" xmlns:pc="http://schemas.microsoft.com/office/powerpoint/2013/main/command">
   <pc:docChgLst>
+    <pc:chgData name="Marcia Moraes" userId="c9c67e8a-58e2-4733-9a1c-5d44fec4775b" providerId="ADAL" clId="{58806465-151D-46CB-A69C-EFB3BC3DBF8E}"/>
+    <pc:docChg chg="modSld">
+      <pc:chgData name="Marcia Moraes" userId="c9c67e8a-58e2-4733-9a1c-5d44fec4775b" providerId="ADAL" clId="{58806465-151D-46CB-A69C-EFB3BC3DBF8E}" dt="2023-11-13T15:19:19.740" v="1"/>
+      <pc:docMkLst>
+        <pc:docMk/>
+      </pc:docMkLst>
+      <pc:sldChg chg="modSp">
+        <pc:chgData name="Marcia Moraes" userId="c9c67e8a-58e2-4733-9a1c-5d44fec4775b" providerId="ADAL" clId="{58806465-151D-46CB-A69C-EFB3BC3DBF8E}" dt="2023-11-13T15:19:19.740" v="1"/>
+        <pc:sldMkLst>
+          <pc:docMk/>
+          <pc:sldMk cId="2571368551" sldId="272"/>
+        </pc:sldMkLst>
+        <pc:graphicFrameChg chg="mod modGraphic">
+          <ac:chgData name="Marcia Moraes" userId="c9c67e8a-58e2-4733-9a1c-5d44fec4775b" providerId="ADAL" clId="{58806465-151D-46CB-A69C-EFB3BC3DBF8E}" dt="2023-11-13T15:19:19.740" v="1"/>
+          <ac:graphicFrameMkLst>
+            <pc:docMk/>
+            <pc:sldMk cId="2571368551" sldId="272"/>
+            <ac:graphicFrameMk id="8" creationId="{07C62F30-3C9C-4AF5-865C-4C1E0C950E9D}"/>
+          </ac:graphicFrameMkLst>
+        </pc:graphicFrameChg>
+      </pc:sldChg>
+    </pc:docChg>
+  </pc:docChgLst>
+  <pc:docChgLst>
     <pc:chgData name="Moraes,Marcia" userId="c9c67e8a-58e2-4733-9a1c-5d44fec4775b" providerId="ADAL" clId="{BF322DDB-2F5C-4464-8059-49CA23CDD3A7}"/>
   </pc:docChgLst>
   <pc:docChgLst>
@@ -274,7 +298,7 @@
           <a:p>
             <a:fld id="{4D7E51A5-B478-1E40-8CBB-0DAA8831E99D}" type="datetimeFigureOut">
               <a:rPr lang="en-US" smtClean="0"/>
-              <a:t>11/12/2023</a:t>
+              <a:t>11/13/2023</a:t>
             </a:fld>
             <a:endParaRPr lang="en-US"/>
           </a:p>
@@ -439,7 +463,7 @@
           <a:p>
             <a:fld id="{D0ED587F-861E-6740-9643-E3DDAE89B8D6}" type="datetimeFigureOut">
               <a:rPr lang="en-US" smtClean="0"/>
-              <a:t>11/12/2023</a:t>
+              <a:t>11/13/2023</a:t>
             </a:fld>
             <a:endParaRPr lang="en-US"/>
           </a:p>
@@ -9350,14 +9374,14 @@
           <p:nvPr>
             <p:extLst>
               <p:ext uri="{D42A27DB-BD31-4B8C-83A1-F6EECF244321}">
-                <p14:modId xmlns:p14="http://schemas.microsoft.com/office/powerpoint/2010/main" val="1214545650"/>
+                <p14:modId xmlns:p14="http://schemas.microsoft.com/office/powerpoint/2010/main" val="1597091337"/>
               </p:ext>
             </p:extLst>
           </p:nvPr>
         </p:nvGraphicFramePr>
         <p:xfrm>
           <a:off x="9987253" y="4063757"/>
-          <a:ext cx="3572199" cy="3253859"/>
+          <a:ext cx="3572199" cy="2639165"/>
         </p:xfrm>
         <a:graphic>
           <a:graphicData uri="http://schemas.openxmlformats.org/drawingml/2006/table">
@@ -10326,177 +10350,10 @@
                         </a:spcAft>
                       </a:pPr>
                       <a:r>
-                        <a:rPr lang="en-US" sz="1600">
+                        <a:rPr lang="en-US" sz="1600" dirty="0">
                           <a:effectLst/>
                         </a:rPr>
                         <a:t>3 PM - 5 PM : CSB 120</a:t>
-                      </a:r>
-                      <a:endParaRPr lang="en-US" sz="1600">
-                        <a:effectLst/>
-                        <a:latin typeface="Calibri" panose="020F0502020204030204" pitchFamily="34" charset="0"/>
-                        <a:ea typeface="Calibri" panose="020F0502020204030204" pitchFamily="34" charset="0"/>
-                        <a:cs typeface="Times New Roman" panose="02020603050405020304" pitchFamily="18" charset="0"/>
-                      </a:endParaRPr>
-                    </a:p>
-                  </a:txBody>
-                  <a:tcPr marL="15875" marR="15875" marT="15875" marB="15875" anchor="ctr">
-                    <a:lnL w="12700" cap="flat" cmpd="sng" algn="ctr">
-                      <a:solidFill>
-                        <a:schemeClr val="tx1"/>
-                      </a:solidFill>
-                      <a:prstDash val="solid"/>
-                      <a:round/>
-                      <a:headEnd type="none" w="med" len="med"/>
-                      <a:tailEnd type="none" w="med" len="med"/>
-                    </a:lnL>
-                    <a:lnR w="12700" cap="flat" cmpd="sng" algn="ctr">
-                      <a:solidFill>
-                        <a:schemeClr val="tx1"/>
-                      </a:solidFill>
-                      <a:prstDash val="solid"/>
-                      <a:round/>
-                      <a:headEnd type="none" w="med" len="med"/>
-                      <a:tailEnd type="none" w="med" len="med"/>
-                    </a:lnR>
-                    <a:lnT w="12700" cap="flat" cmpd="sng" algn="ctr">
-                      <a:solidFill>
-                        <a:schemeClr val="tx1"/>
-                      </a:solidFill>
-                      <a:prstDash val="solid"/>
-                      <a:round/>
-                      <a:headEnd type="none" w="med" len="med"/>
-                      <a:tailEnd type="none" w="med" len="med"/>
-                    </a:lnT>
-                    <a:lnB w="12700" cap="flat" cmpd="sng" algn="ctr">
-                      <a:solidFill>
-                        <a:schemeClr val="tx1"/>
-                      </a:solidFill>
-                      <a:prstDash val="solid"/>
-                      <a:round/>
-                      <a:headEnd type="none" w="med" len="med"/>
-                      <a:tailEnd type="none" w="med" len="med"/>
-                    </a:lnB>
-                    <a:lnTlToBr w="12700" cmpd="sng">
-                      <a:noFill/>
-                      <a:prstDash val="solid"/>
-                    </a:lnTlToBr>
-                    <a:lnBlToTr w="12700" cmpd="sng">
-                      <a:noFill/>
-                      <a:prstDash val="solid"/>
-                    </a:lnBlToTr>
-                    <a:solidFill>
-                      <a:schemeClr val="bg1"/>
-                    </a:solidFill>
-                  </a:tcPr>
-                </a:tc>
-                <a:extLst>
-                  <a:ext uri="{0D108BD9-81ED-4DB2-BD59-A6C34878D82A}">
-                    <a16:rowId xmlns:a16="http://schemas.microsoft.com/office/drawing/2014/main" val="1553865624"/>
-                  </a:ext>
-                </a:extLst>
-              </a:tr>
-              <a:tr h="307347">
-                <a:tc>
-                  <a:txBody>
-                    <a:bodyPr/>
-                    <a:lstStyle/>
-                    <a:p>
-                      <a:pPr marL="0" marR="0">
-                        <a:lnSpc>
-                          <a:spcPct val="107000"/>
-                        </a:lnSpc>
-                        <a:spcBef>
-                          <a:spcPts val="0"/>
-                        </a:spcBef>
-                        <a:spcAft>
-                          <a:spcPts val="800"/>
-                        </a:spcAft>
-                      </a:pPr>
-                      <a:r>
-                        <a:rPr lang="en-US" sz="1600">
-                          <a:effectLst/>
-                        </a:rPr>
-                        <a:t>Saturday</a:t>
-                      </a:r>
-                      <a:endParaRPr lang="en-US" sz="1600">
-                        <a:effectLst/>
-                        <a:latin typeface="Calibri" panose="020F0502020204030204" pitchFamily="34" charset="0"/>
-                        <a:ea typeface="Calibri" panose="020F0502020204030204" pitchFamily="34" charset="0"/>
-                        <a:cs typeface="Times New Roman" panose="02020603050405020304" pitchFamily="18" charset="0"/>
-                      </a:endParaRPr>
-                    </a:p>
-                  </a:txBody>
-                  <a:tcPr marL="15875" marR="15875" marT="15875" marB="15875" anchor="ctr">
-                    <a:lnL w="12700" cap="flat" cmpd="sng" algn="ctr">
-                      <a:solidFill>
-                        <a:schemeClr val="tx1"/>
-                      </a:solidFill>
-                      <a:prstDash val="solid"/>
-                      <a:round/>
-                      <a:headEnd type="none" w="med" len="med"/>
-                      <a:tailEnd type="none" w="med" len="med"/>
-                    </a:lnL>
-                    <a:lnR w="12700" cap="flat" cmpd="sng" algn="ctr">
-                      <a:solidFill>
-                        <a:schemeClr val="tx1"/>
-                      </a:solidFill>
-                      <a:prstDash val="solid"/>
-                      <a:round/>
-                      <a:headEnd type="none" w="med" len="med"/>
-                      <a:tailEnd type="none" w="med" len="med"/>
-                    </a:lnR>
-                    <a:lnT w="12700" cap="flat" cmpd="sng" algn="ctr">
-                      <a:solidFill>
-                        <a:schemeClr val="tx1"/>
-                      </a:solidFill>
-                      <a:prstDash val="solid"/>
-                      <a:round/>
-                      <a:headEnd type="none" w="med" len="med"/>
-                      <a:tailEnd type="none" w="med" len="med"/>
-                    </a:lnT>
-                    <a:lnB w="12700" cap="flat" cmpd="sng" algn="ctr">
-                      <a:solidFill>
-                        <a:schemeClr val="tx1"/>
-                      </a:solidFill>
-                      <a:prstDash val="solid"/>
-                      <a:round/>
-                      <a:headEnd type="none" w="med" len="med"/>
-                      <a:tailEnd type="none" w="med" len="med"/>
-                    </a:lnB>
-                    <a:lnTlToBr w="12700" cmpd="sng">
-                      <a:noFill/>
-                      <a:prstDash val="solid"/>
-                    </a:lnTlToBr>
-                    <a:lnBlToTr w="12700" cmpd="sng">
-                      <a:noFill/>
-                      <a:prstDash val="solid"/>
-                    </a:lnBlToTr>
-                    <a:solidFill>
-                      <a:schemeClr val="bg1"/>
-                    </a:solidFill>
-                  </a:tcPr>
-                </a:tc>
-                <a:tc>
-                  <a:txBody>
-                    <a:bodyPr/>
-                    <a:lstStyle/>
-                    <a:p>
-                      <a:pPr marL="0" marR="0">
-                        <a:lnSpc>
-                          <a:spcPct val="107000"/>
-                        </a:lnSpc>
-                        <a:spcBef>
-                          <a:spcPts val="0"/>
-                        </a:spcBef>
-                        <a:spcAft>
-                          <a:spcPts val="800"/>
-                        </a:spcAft>
-                      </a:pPr>
-                      <a:r>
-                        <a:rPr lang="en-US" sz="1600" dirty="0">
-                          <a:effectLst/>
-                        </a:rPr>
-                        <a:t>12 PM - 4 PM : Teams</a:t>
                       </a:r>
                       <a:endParaRPr lang="en-US" sz="1600" dirty="0">
                         <a:effectLst/>
@@ -10558,174 +10415,7 @@
                 </a:tc>
                 <a:extLst>
                   <a:ext uri="{0D108BD9-81ED-4DB2-BD59-A6C34878D82A}">
-                    <a16:rowId xmlns:a16="http://schemas.microsoft.com/office/drawing/2014/main" val="3921746368"/>
-                  </a:ext>
-                </a:extLst>
-              </a:tr>
-              <a:tr h="307347">
-                <a:tc>
-                  <a:txBody>
-                    <a:bodyPr/>
-                    <a:lstStyle/>
-                    <a:p>
-                      <a:pPr marL="0" marR="0">
-                        <a:lnSpc>
-                          <a:spcPct val="107000"/>
-                        </a:lnSpc>
-                        <a:spcBef>
-                          <a:spcPts val="0"/>
-                        </a:spcBef>
-                        <a:spcAft>
-                          <a:spcPts val="800"/>
-                        </a:spcAft>
-                      </a:pPr>
-                      <a:r>
-                        <a:rPr lang="en-US" sz="1600">
-                          <a:effectLst/>
-                        </a:rPr>
-                        <a:t>Sunday</a:t>
-                      </a:r>
-                      <a:endParaRPr lang="en-US" sz="1600">
-                        <a:effectLst/>
-                        <a:latin typeface="Calibri" panose="020F0502020204030204" pitchFamily="34" charset="0"/>
-                        <a:ea typeface="Calibri" panose="020F0502020204030204" pitchFamily="34" charset="0"/>
-                        <a:cs typeface="Times New Roman" panose="02020603050405020304" pitchFamily="18" charset="0"/>
-                      </a:endParaRPr>
-                    </a:p>
-                  </a:txBody>
-                  <a:tcPr marL="15875" marR="15875" marT="15875" marB="15875" anchor="ctr">
-                    <a:lnL w="12700" cap="flat" cmpd="sng" algn="ctr">
-                      <a:solidFill>
-                        <a:schemeClr val="tx1"/>
-                      </a:solidFill>
-                      <a:prstDash val="solid"/>
-                      <a:round/>
-                      <a:headEnd type="none" w="med" len="med"/>
-                      <a:tailEnd type="none" w="med" len="med"/>
-                    </a:lnL>
-                    <a:lnR w="12700" cap="flat" cmpd="sng" algn="ctr">
-                      <a:solidFill>
-                        <a:schemeClr val="tx1"/>
-                      </a:solidFill>
-                      <a:prstDash val="solid"/>
-                      <a:round/>
-                      <a:headEnd type="none" w="med" len="med"/>
-                      <a:tailEnd type="none" w="med" len="med"/>
-                    </a:lnR>
-                    <a:lnT w="12700" cap="flat" cmpd="sng" algn="ctr">
-                      <a:solidFill>
-                        <a:schemeClr val="tx1"/>
-                      </a:solidFill>
-                      <a:prstDash val="solid"/>
-                      <a:round/>
-                      <a:headEnd type="none" w="med" len="med"/>
-                      <a:tailEnd type="none" w="med" len="med"/>
-                    </a:lnT>
-                    <a:lnB w="12700" cap="flat" cmpd="sng" algn="ctr">
-                      <a:solidFill>
-                        <a:schemeClr val="tx1"/>
-                      </a:solidFill>
-                      <a:prstDash val="solid"/>
-                      <a:round/>
-                      <a:headEnd type="none" w="med" len="med"/>
-                      <a:tailEnd type="none" w="med" len="med"/>
-                    </a:lnB>
-                    <a:lnTlToBr w="12700" cmpd="sng">
-                      <a:noFill/>
-                      <a:prstDash val="solid"/>
-                    </a:lnTlToBr>
-                    <a:lnBlToTr w="12700" cmpd="sng">
-                      <a:noFill/>
-                      <a:prstDash val="solid"/>
-                    </a:lnBlToTr>
-                    <a:solidFill>
-                      <a:schemeClr val="bg1"/>
-                    </a:solidFill>
-                  </a:tcPr>
-                </a:tc>
-                <a:tc>
-                  <a:txBody>
-                    <a:bodyPr/>
-                    <a:lstStyle/>
-                    <a:p>
-                      <a:pPr marL="0" marR="0">
-                        <a:lnSpc>
-                          <a:spcPct val="107000"/>
-                        </a:lnSpc>
-                        <a:spcBef>
-                          <a:spcPts val="0"/>
-                        </a:spcBef>
-                        <a:spcAft>
-                          <a:spcPts val="800"/>
-                        </a:spcAft>
-                      </a:pPr>
-                      <a:r>
-                        <a:rPr lang="en-US" sz="1600" dirty="0">
-                          <a:effectLst/>
-                        </a:rPr>
-                        <a:t>12 PM - 4 PM : Teams</a:t>
-                      </a:r>
-                      <a:endParaRPr lang="en-US" sz="1600" dirty="0">
-                        <a:effectLst/>
-                        <a:latin typeface="Calibri" panose="020F0502020204030204" pitchFamily="34" charset="0"/>
-                        <a:ea typeface="Calibri" panose="020F0502020204030204" pitchFamily="34" charset="0"/>
-                        <a:cs typeface="Times New Roman" panose="02020603050405020304" pitchFamily="18" charset="0"/>
-                      </a:endParaRPr>
-                    </a:p>
-                  </a:txBody>
-                  <a:tcPr marL="15875" marR="15875" marT="15875" marB="15875" anchor="ctr">
-                    <a:lnL w="12700" cap="flat" cmpd="sng" algn="ctr">
-                      <a:solidFill>
-                        <a:schemeClr val="tx1"/>
-                      </a:solidFill>
-                      <a:prstDash val="solid"/>
-                      <a:round/>
-                      <a:headEnd type="none" w="med" len="med"/>
-                      <a:tailEnd type="none" w="med" len="med"/>
-                    </a:lnL>
-                    <a:lnR w="12700" cap="flat" cmpd="sng" algn="ctr">
-                      <a:solidFill>
-                        <a:schemeClr val="tx1"/>
-                      </a:solidFill>
-                      <a:prstDash val="solid"/>
-                      <a:round/>
-                      <a:headEnd type="none" w="med" len="med"/>
-                      <a:tailEnd type="none" w="med" len="med"/>
-                    </a:lnR>
-                    <a:lnT w="12700" cap="flat" cmpd="sng" algn="ctr">
-                      <a:solidFill>
-                        <a:schemeClr val="tx1"/>
-                      </a:solidFill>
-                      <a:prstDash val="solid"/>
-                      <a:round/>
-                      <a:headEnd type="none" w="med" len="med"/>
-                      <a:tailEnd type="none" w="med" len="med"/>
-                    </a:lnT>
-                    <a:lnB w="12700" cap="flat" cmpd="sng" algn="ctr">
-                      <a:solidFill>
-                        <a:schemeClr val="tx1"/>
-                      </a:solidFill>
-                      <a:prstDash val="solid"/>
-                      <a:round/>
-                      <a:headEnd type="none" w="med" len="med"/>
-                      <a:tailEnd type="none" w="med" len="med"/>
-                    </a:lnB>
-                    <a:lnTlToBr w="12700" cmpd="sng">
-                      <a:noFill/>
-                      <a:prstDash val="solid"/>
-                    </a:lnTlToBr>
-                    <a:lnBlToTr w="12700" cmpd="sng">
-                      <a:noFill/>
-                      <a:prstDash val="solid"/>
-                    </a:lnBlToTr>
-                    <a:solidFill>
-                      <a:schemeClr val="bg1"/>
-                    </a:solidFill>
-                  </a:tcPr>
-                </a:tc>
-                <a:extLst>
-                  <a:ext uri="{0D108BD9-81ED-4DB2-BD59-A6C34878D82A}">
-                    <a16:rowId xmlns:a16="http://schemas.microsoft.com/office/drawing/2014/main" val="1928039740"/>
+                    <a16:rowId xmlns:a16="http://schemas.microsoft.com/office/drawing/2014/main" val="1553865624"/>
                   </a:ext>
                 </a:extLst>
               </a:tr>
@@ -19712,6 +19402,23 @@
 </file>
 
 <file path=customXml/item1.xml><?xml version="1.0" encoding="utf-8"?>
+<?mso-contentType ?>
+<FormTemplates xmlns="http://schemas.microsoft.com/sharepoint/v3/contenttype/forms">
+  <Display>DocumentLibraryForm</Display>
+  <Edit>DocumentLibraryForm</Edit>
+  <New>DocumentLibraryForm</New>
+</FormTemplates>
+</file>
+
+<file path=customXml/item2.xml><?xml version="1.0" encoding="utf-8"?>
+<p:properties xmlns:p="http://schemas.microsoft.com/office/2006/metadata/properties" xmlns:xsi="http://www.w3.org/2001/XMLSchema-instance" xmlns:pc="http://schemas.microsoft.com/office/infopath/2007/PartnerControls">
+  <documentManagement>
+    <_activity xmlns="92c41bee-f0ee-4aa6-9399-a35fbb883510" xsi:nil="true"/>
+  </documentManagement>
+</p:properties>
+</file>
+
+<file path=customXml/item3.xml><?xml version="1.0" encoding="utf-8"?>
 <ct:contentTypeSchema xmlns:ct="http://schemas.microsoft.com/office/2006/metadata/contentType" xmlns:ma="http://schemas.microsoft.com/office/2006/metadata/properties/metaAttributes" ct:_="" ma:_="" ma:contentTypeName="Document" ma:contentTypeID="0x010100074387D78AC76C4289401EF66FB51FCC" ma:contentTypeVersion="15" ma:contentTypeDescription="Create a new document." ma:contentTypeScope="" ma:versionID="d3659bec8b8330148a03d82a9d99f412">
   <xsd:schema xmlns:xsd="http://www.w3.org/2001/XMLSchema" xmlns:xs="http://www.w3.org/2001/XMLSchema" xmlns:p="http://schemas.microsoft.com/office/2006/metadata/properties" xmlns:ns3="92c41bee-f0ee-4aa6-9399-a35fbb883510" xmlns:ns4="e06ed288-fd75-4b50-bbed-f5a5df88c31c" targetNamespace="http://schemas.microsoft.com/office/2006/metadata/properties" ma:root="true" ma:fieldsID="1a21d371127b63848c9a2290f5945250" ns3:_="" ns4:_="">
     <xsd:import namespace="92c41bee-f0ee-4aa6-9399-a35fbb883510"/>
@@ -19946,24 +19653,32 @@
 </ct:contentTypeSchema>
 </file>
 
-<file path=customXml/item2.xml><?xml version="1.0" encoding="utf-8"?>
-<p:properties xmlns:p="http://schemas.microsoft.com/office/2006/metadata/properties" xmlns:xsi="http://www.w3.org/2001/XMLSchema-instance" xmlns:pc="http://schemas.microsoft.com/office/infopath/2007/PartnerControls">
-  <documentManagement>
-    <_activity xmlns="92c41bee-f0ee-4aa6-9399-a35fbb883510" xsi:nil="true"/>
-  </documentManagement>
-</p:properties>
+<file path=customXml/itemProps1.xml><?xml version="1.0" encoding="utf-8"?>
+<ds:datastoreItem xmlns:ds="http://schemas.openxmlformats.org/officeDocument/2006/customXml" ds:itemID="{4CBADBC1-621B-4EED-B3DE-D3AE3A093F17}">
+  <ds:schemaRefs>
+    <ds:schemaRef ds:uri="http://schemas.microsoft.com/sharepoint/v3/contenttype/forms"/>
+  </ds:schemaRefs>
+</ds:datastoreItem>
 </file>
 
-<file path=customXml/item3.xml><?xml version="1.0" encoding="utf-8"?>
-<?mso-contentType ?>
-<FormTemplates xmlns="http://schemas.microsoft.com/sharepoint/v3/contenttype/forms">
-  <Display>DocumentLibraryForm</Display>
-  <Edit>DocumentLibraryForm</Edit>
-  <New>DocumentLibraryForm</New>
-</FormTemplates>
+<file path=customXml/itemProps2.xml><?xml version="1.0" encoding="utf-8"?>
+<ds:datastoreItem xmlns:ds="http://schemas.openxmlformats.org/officeDocument/2006/customXml" ds:itemID="{04408E98-FD53-4752-B390-626386BBD724}">
+  <ds:schemaRefs>
+    <ds:schemaRef ds:uri="http://purl.org/dc/elements/1.1/"/>
+    <ds:schemaRef ds:uri="http://schemas.microsoft.com/office/2006/documentManagement/types"/>
+    <ds:schemaRef ds:uri="e06ed288-fd75-4b50-bbed-f5a5df88c31c"/>
+    <ds:schemaRef ds:uri="http://schemas.openxmlformats.org/package/2006/metadata/core-properties"/>
+    <ds:schemaRef ds:uri="http://purl.org/dc/dcmitype/"/>
+    <ds:schemaRef ds:uri="http://schemas.microsoft.com/office/infopath/2007/PartnerControls"/>
+    <ds:schemaRef ds:uri="http://schemas.microsoft.com/office/2006/metadata/properties"/>
+    <ds:schemaRef ds:uri="92c41bee-f0ee-4aa6-9399-a35fbb883510"/>
+    <ds:schemaRef ds:uri="http://www.w3.org/XML/1998/namespace"/>
+    <ds:schemaRef ds:uri="http://purl.org/dc/terms/"/>
+  </ds:schemaRefs>
+</ds:datastoreItem>
 </file>
 
-<file path=customXml/itemProps1.xml><?xml version="1.0" encoding="utf-8"?>
+<file path=customXml/itemProps3.xml><?xml version="1.0" encoding="utf-8"?>
 <ds:datastoreItem xmlns:ds="http://schemas.openxmlformats.org/officeDocument/2006/customXml" ds:itemID="{D7602377-4D0E-4F57-8B88-87CF797A6B5D}">
   <ds:schemaRefs>
     <ds:schemaRef ds:uri="http://schemas.microsoft.com/office/2006/metadata/contentType"/>
@@ -19980,29 +19695,4 @@
     <ds:schemaRef ds:uri="http://schemas.microsoft.com/internal/obd"/>
   </ds:schemaRefs>
 </ds:datastoreItem>
-</file>
-
-<file path=customXml/itemProps2.xml><?xml version="1.0" encoding="utf-8"?>
-<ds:datastoreItem xmlns:ds="http://schemas.openxmlformats.org/officeDocument/2006/customXml" ds:itemID="{04408E98-FD53-4752-B390-626386BBD724}">
-  <ds:schemaRefs>
-    <ds:schemaRef ds:uri="92c41bee-f0ee-4aa6-9399-a35fbb883510"/>
-    <ds:schemaRef ds:uri="http://schemas.microsoft.com/office/2006/documentManagement/types"/>
-    <ds:schemaRef ds:uri="http://schemas.openxmlformats.org/package/2006/metadata/core-properties"/>
-    <ds:schemaRef ds:uri="http://schemas.microsoft.com/office/2006/metadata/properties"/>
-    <ds:schemaRef ds:uri="http://purl.org/dc/elements/1.1/"/>
-    <ds:schemaRef ds:uri="http://schemas.microsoft.com/office/infopath/2007/PartnerControls"/>
-    <ds:schemaRef ds:uri="e06ed288-fd75-4b50-bbed-f5a5df88c31c"/>
-    <ds:schemaRef ds:uri="http://purl.org/dc/terms/"/>
-    <ds:schemaRef ds:uri="http://www.w3.org/XML/1998/namespace"/>
-    <ds:schemaRef ds:uri="http://purl.org/dc/dcmitype/"/>
-  </ds:schemaRefs>
-</ds:datastoreItem>
-</file>
-
-<file path=customXml/itemProps3.xml><?xml version="1.0" encoding="utf-8"?>
-<ds:datastoreItem xmlns:ds="http://schemas.openxmlformats.org/officeDocument/2006/customXml" ds:itemID="{4CBADBC1-621B-4EED-B3DE-D3AE3A093F17}">
-  <ds:schemaRefs>
-    <ds:schemaRef ds:uri="http://schemas.microsoft.com/sharepoint/v3/contenttype/forms"/>
-  </ds:schemaRefs>
-</ds:datastoreItem>
 </file>
</xml_diff>

<commit_message>
Week 13 slides updated
</commit_message>
<xml_diff>
--- a/slides/On-Campus/13_01_More Recursion.pptx
+++ b/slides/On-Campus/13_01_More Recursion.pptx
@@ -148,49 +148,25 @@
 <pc:chgInfo xmlns:a="http://schemas.openxmlformats.org/drawingml/2006/main" xmlns:r="http://schemas.openxmlformats.org/officeDocument/2006/relationships" xmlns:ac="http://schemas.microsoft.com/office/drawing/2013/main/command" xmlns:pc="http://schemas.microsoft.com/office/powerpoint/2013/main/command">
   <pc:docChgLst>
     <pc:chgData name="Marcia Moraes" userId="c9c67e8a-58e2-4733-9a1c-5d44fec4775b" providerId="ADAL" clId="{58806465-151D-46CB-A69C-EFB3BC3DBF8E}"/>
-    <pc:docChg chg="undo redo modSld">
-      <pc:chgData name="Marcia Moraes" userId="c9c67e8a-58e2-4733-9a1c-5d44fec4775b" providerId="ADAL" clId="{58806465-151D-46CB-A69C-EFB3BC3DBF8E}" dt="2023-11-13T18:49:09.299" v="6" actId="20577"/>
+  </pc:docChgLst>
+  <pc:docChgLst>
+    <pc:chgData name="Moraes,Marcia" userId="c9c67e8a-58e2-4733-9a1c-5d44fec4775b" providerId="ADAL" clId="{BF322DDB-2F5C-4464-8059-49CA23CDD3A7}"/>
+  </pc:docChgLst>
+  <pc:docChgLst>
+    <pc:chgData name="Marcia Moraes" userId="c9c67e8a-58e2-4733-9a1c-5d44fec4775b" providerId="ADAL" clId="{B104F170-C165-4514-824B-FC635C054BBB}"/>
+    <pc:docChg chg="modSld">
+      <pc:chgData name="Marcia Moraes" userId="c9c67e8a-58e2-4733-9a1c-5d44fec4775b" providerId="ADAL" clId="{B104F170-C165-4514-824B-FC635C054BBB}" dt="2024-03-07T20:19:11.474" v="2" actId="20577"/>
       <pc:docMkLst>
         <pc:docMk/>
       </pc:docMkLst>
       <pc:sldChg chg="modSp">
-        <pc:chgData name="Marcia Moraes" userId="c9c67e8a-58e2-4733-9a1c-5d44fec4775b" providerId="ADAL" clId="{58806465-151D-46CB-A69C-EFB3BC3DBF8E}" dt="2023-11-13T18:47:10.529" v="3" actId="20577"/>
-        <pc:sldMkLst>
-          <pc:docMk/>
-          <pc:sldMk cId="2655374256" sldId="259"/>
-        </pc:sldMkLst>
-        <pc:spChg chg="mod">
-          <ac:chgData name="Marcia Moraes" userId="c9c67e8a-58e2-4733-9a1c-5d44fec4775b" providerId="ADAL" clId="{58806465-151D-46CB-A69C-EFB3BC3DBF8E}" dt="2023-11-13T18:47:10.529" v="3" actId="20577"/>
-          <ac:spMkLst>
-            <pc:docMk/>
-            <pc:sldMk cId="2655374256" sldId="259"/>
-            <ac:spMk id="3" creationId="{8F7DF8C6-72F2-6C44-BB2D-11741B6AA9D5}"/>
-          </ac:spMkLst>
-        </pc:spChg>
-      </pc:sldChg>
-      <pc:sldChg chg="modSp">
-        <pc:chgData name="Marcia Moraes" userId="c9c67e8a-58e2-4733-9a1c-5d44fec4775b" providerId="ADAL" clId="{58806465-151D-46CB-A69C-EFB3BC3DBF8E}" dt="2023-11-13T18:49:09.299" v="6" actId="20577"/>
-        <pc:sldMkLst>
-          <pc:docMk/>
-          <pc:sldMk cId="216470046" sldId="260"/>
-        </pc:sldMkLst>
-        <pc:spChg chg="mod">
-          <ac:chgData name="Marcia Moraes" userId="c9c67e8a-58e2-4733-9a1c-5d44fec4775b" providerId="ADAL" clId="{58806465-151D-46CB-A69C-EFB3BC3DBF8E}" dt="2023-11-13T18:49:09.299" v="6" actId="20577"/>
-          <ac:spMkLst>
-            <pc:docMk/>
-            <pc:sldMk cId="216470046" sldId="260"/>
-            <ac:spMk id="3" creationId="{20275C6A-A900-BF4E-B253-6445E559FBAD}"/>
-          </ac:spMkLst>
-        </pc:spChg>
-      </pc:sldChg>
-      <pc:sldChg chg="modSp">
-        <pc:chgData name="Marcia Moraes" userId="c9c67e8a-58e2-4733-9a1c-5d44fec4775b" providerId="ADAL" clId="{58806465-151D-46CB-A69C-EFB3BC3DBF8E}" dt="2023-11-13T15:19:19.740" v="1"/>
+        <pc:chgData name="Marcia Moraes" userId="c9c67e8a-58e2-4733-9a1c-5d44fec4775b" providerId="ADAL" clId="{B104F170-C165-4514-824B-FC635C054BBB}" dt="2024-03-07T20:19:11.474" v="2" actId="20577"/>
         <pc:sldMkLst>
           <pc:docMk/>
           <pc:sldMk cId="2571368551" sldId="272"/>
         </pc:sldMkLst>
-        <pc:graphicFrameChg chg="mod modGraphic">
-          <ac:chgData name="Marcia Moraes" userId="c9c67e8a-58e2-4733-9a1c-5d44fec4775b" providerId="ADAL" clId="{58806465-151D-46CB-A69C-EFB3BC3DBF8E}" dt="2023-11-13T15:19:19.740" v="1"/>
+        <pc:graphicFrameChg chg="modGraphic">
+          <ac:chgData name="Marcia Moraes" userId="c9c67e8a-58e2-4733-9a1c-5d44fec4775b" providerId="ADAL" clId="{B104F170-C165-4514-824B-FC635C054BBB}" dt="2024-03-07T20:19:11.474" v="2" actId="20577"/>
           <ac:graphicFrameMkLst>
             <pc:docMk/>
             <pc:sldMk cId="2571368551" sldId="272"/>
@@ -201,47 +177,7 @@
     </pc:docChg>
   </pc:docChgLst>
   <pc:docChgLst>
-    <pc:chgData name="Moraes,Marcia" userId="c9c67e8a-58e2-4733-9a1c-5d44fec4775b" providerId="ADAL" clId="{BF322DDB-2F5C-4464-8059-49CA23CDD3A7}"/>
-  </pc:docChgLst>
-  <pc:docChgLst>
     <pc:chgData name="Moraes,Marcia" userId="c9c67e8a-58e2-4733-9a1c-5d44fec4775b" providerId="ADAL" clId="{58806465-151D-46CB-A69C-EFB3BC3DBF8E}"/>
-    <pc:docChg chg="custSel modSld">
-      <pc:chgData name="Moraes,Marcia" userId="c9c67e8a-58e2-4733-9a1c-5d44fec4775b" providerId="ADAL" clId="{58806465-151D-46CB-A69C-EFB3BC3DBF8E}" dt="2023-11-12T18:40:52.653" v="1"/>
-      <pc:docMkLst>
-        <pc:docMk/>
-      </pc:docMkLst>
-      <pc:sldChg chg="addSp delSp">
-        <pc:chgData name="Moraes,Marcia" userId="c9c67e8a-58e2-4733-9a1c-5d44fec4775b" providerId="ADAL" clId="{58806465-151D-46CB-A69C-EFB3BC3DBF8E}" dt="2023-11-12T18:40:52.653" v="1"/>
-        <pc:sldMkLst>
-          <pc:docMk/>
-          <pc:sldMk cId="2571368551" sldId="272"/>
-        </pc:sldMkLst>
-        <pc:spChg chg="del">
-          <ac:chgData name="Moraes,Marcia" userId="c9c67e8a-58e2-4733-9a1c-5d44fec4775b" providerId="ADAL" clId="{58806465-151D-46CB-A69C-EFB3BC3DBF8E}" dt="2023-11-12T18:39:45.834" v="0" actId="478"/>
-          <ac:spMkLst>
-            <pc:docMk/>
-            <pc:sldMk cId="2571368551" sldId="272"/>
-            <ac:spMk id="5" creationId="{1E54CBCD-3447-4F03-970A-F1628F46BEF2}"/>
-          </ac:spMkLst>
-        </pc:spChg>
-        <pc:spChg chg="add">
-          <ac:chgData name="Moraes,Marcia" userId="c9c67e8a-58e2-4733-9a1c-5d44fec4775b" providerId="ADAL" clId="{58806465-151D-46CB-A69C-EFB3BC3DBF8E}" dt="2023-11-12T18:40:52.653" v="1"/>
-          <ac:spMkLst>
-            <pc:docMk/>
-            <pc:sldMk cId="2571368551" sldId="272"/>
-            <ac:spMk id="7" creationId="{C46EA5F7-AEC0-40D7-893C-CAA04D08439D}"/>
-          </ac:spMkLst>
-        </pc:spChg>
-        <pc:graphicFrameChg chg="add">
-          <ac:chgData name="Moraes,Marcia" userId="c9c67e8a-58e2-4733-9a1c-5d44fec4775b" providerId="ADAL" clId="{58806465-151D-46CB-A69C-EFB3BC3DBF8E}" dt="2023-11-12T18:40:52.653" v="1"/>
-          <ac:graphicFrameMkLst>
-            <pc:docMk/>
-            <pc:sldMk cId="2571368551" sldId="272"/>
-            <ac:graphicFrameMk id="8" creationId="{07C62F30-3C9C-4AF5-865C-4C1E0C950E9D}"/>
-          </ac:graphicFrameMkLst>
-        </pc:graphicFrameChg>
-      </pc:sldChg>
-    </pc:docChg>
   </pc:docChgLst>
 </pc:chgInfo>
 </file>
@@ -328,7 +264,7 @@
           <a:p>
             <a:fld id="{4D7E51A5-B478-1E40-8CBB-0DAA8831E99D}" type="datetimeFigureOut">
               <a:rPr lang="en-US" smtClean="0"/>
-              <a:t>11/13/2023</a:t>
+              <a:t>3/7/2024</a:t>
             </a:fld>
             <a:endParaRPr lang="en-US"/>
           </a:p>
@@ -493,7 +429,7 @@
           <a:p>
             <a:fld id="{D0ED587F-861E-6740-9643-E3DDAE89B8D6}" type="datetimeFigureOut">
               <a:rPr lang="en-US" smtClean="0"/>
-              <a:t>11/13/2023</a:t>
+              <a:t>3/7/2024</a:t>
             </a:fld>
             <a:endParaRPr lang="en-US"/>
           </a:p>
@@ -9408,7 +9344,7 @@
           <p:nvPr>
             <p:extLst>
               <p:ext uri="{D42A27DB-BD31-4B8C-83A1-F6EECF244321}">
-                <p14:modId xmlns:p14="http://schemas.microsoft.com/office/powerpoint/2010/main" val="1597091337"/>
+                <p14:modId xmlns:p14="http://schemas.microsoft.com/office/powerpoint/2010/main" val="537505992"/>
               </p:ext>
             </p:extLst>
           </p:nvPr>
@@ -9716,10 +9652,28 @@
                         </a:spcAft>
                       </a:pPr>
                       <a:r>
+                        <a:rPr lang="en-US" sz="1600">
+                          <a:effectLst/>
+                        </a:rPr>
+                        <a:t>2 </a:t>
+                      </a:r>
+                      <a:r>
                         <a:rPr lang="en-US" sz="1600" dirty="0">
                           <a:effectLst/>
                         </a:rPr>
-                        <a:t>12 PM - 2 PM : CSB 120</a:t>
+                        <a:t>PM </a:t>
+                      </a:r>
+                      <a:r>
+                        <a:rPr lang="en-US" sz="1600">
+                          <a:effectLst/>
+                        </a:rPr>
+                        <a:t>- 5 </a:t>
+                      </a:r>
+                      <a:r>
+                        <a:rPr lang="en-US" sz="1600" dirty="0">
+                          <a:effectLst/>
+                        </a:rPr>
+                        <a:t>PM : CSB 120</a:t>
                       </a:r>
                       <a:endParaRPr lang="en-US" sz="1600" dirty="0">
                         <a:effectLst/>
@@ -19445,6 +19399,14 @@
 </file>
 
 <file path=customXml/item2.xml><?xml version="1.0" encoding="utf-8"?>
+<p:properties xmlns:p="http://schemas.microsoft.com/office/2006/metadata/properties" xmlns:xsi="http://www.w3.org/2001/XMLSchema-instance" xmlns:pc="http://schemas.microsoft.com/office/infopath/2007/PartnerControls">
+  <documentManagement>
+    <_activity xmlns="92c41bee-f0ee-4aa6-9399-a35fbb883510" xsi:nil="true"/>
+  </documentManagement>
+</p:properties>
+</file>
+
+<file path=customXml/item3.xml><?xml version="1.0" encoding="utf-8"?>
 <ct:contentTypeSchema xmlns:ct="http://schemas.microsoft.com/office/2006/metadata/contentType" xmlns:ma="http://schemas.microsoft.com/office/2006/metadata/properties/metaAttributes" ct:_="" ma:_="" ma:contentTypeName="Document" ma:contentTypeID="0x010100074387D78AC76C4289401EF66FB51FCC" ma:contentTypeVersion="15" ma:contentTypeDescription="Create a new document." ma:contentTypeScope="" ma:versionID="d3659bec8b8330148a03d82a9d99f412">
   <xsd:schema xmlns:xsd="http://www.w3.org/2001/XMLSchema" xmlns:xs="http://www.w3.org/2001/XMLSchema" xmlns:p="http://schemas.microsoft.com/office/2006/metadata/properties" xmlns:ns3="92c41bee-f0ee-4aa6-9399-a35fbb883510" xmlns:ns4="e06ed288-fd75-4b50-bbed-f5a5df88c31c" targetNamespace="http://schemas.microsoft.com/office/2006/metadata/properties" ma:root="true" ma:fieldsID="1a21d371127b63848c9a2290f5945250" ns3:_="" ns4:_="">
     <xsd:import namespace="92c41bee-f0ee-4aa6-9399-a35fbb883510"/>
@@ -19679,14 +19641,6 @@
 </ct:contentTypeSchema>
 </file>
 
-<file path=customXml/item3.xml><?xml version="1.0" encoding="utf-8"?>
-<p:properties xmlns:p="http://schemas.microsoft.com/office/2006/metadata/properties" xmlns:xsi="http://www.w3.org/2001/XMLSchema-instance" xmlns:pc="http://schemas.microsoft.com/office/infopath/2007/PartnerControls">
-  <documentManagement>
-    <_activity xmlns="92c41bee-f0ee-4aa6-9399-a35fbb883510" xsi:nil="true"/>
-  </documentManagement>
-</p:properties>
-</file>
-
 <file path=customXml/itemProps1.xml><?xml version="1.0" encoding="utf-8"?>
 <ds:datastoreItem xmlns:ds="http://schemas.openxmlformats.org/officeDocument/2006/customXml" ds:itemID="{4CBADBC1-621B-4EED-B3DE-D3AE3A093F17}">
   <ds:schemaRefs>
@@ -19696,6 +19650,23 @@
 </file>
 
 <file path=customXml/itemProps2.xml><?xml version="1.0" encoding="utf-8"?>
+<ds:datastoreItem xmlns:ds="http://schemas.openxmlformats.org/officeDocument/2006/customXml" ds:itemID="{04408E98-FD53-4752-B390-626386BBD724}">
+  <ds:schemaRefs>
+    <ds:schemaRef ds:uri="http://schemas.microsoft.com/office/2006/metadata/properties"/>
+    <ds:schemaRef ds:uri="http://www.w3.org/XML/1998/namespace"/>
+    <ds:schemaRef ds:uri="92c41bee-f0ee-4aa6-9399-a35fbb883510"/>
+    <ds:schemaRef ds:uri="http://schemas.microsoft.com/office/2006/documentManagement/types"/>
+    <ds:schemaRef ds:uri="http://purl.org/dc/terms/"/>
+    <ds:schemaRef ds:uri="http://purl.org/dc/elements/1.1/"/>
+    <ds:schemaRef ds:uri="http://schemas.openxmlformats.org/package/2006/metadata/core-properties"/>
+    <ds:schemaRef ds:uri="http://purl.org/dc/dcmitype/"/>
+    <ds:schemaRef ds:uri="http://schemas.microsoft.com/office/infopath/2007/PartnerControls"/>
+    <ds:schemaRef ds:uri="e06ed288-fd75-4b50-bbed-f5a5df88c31c"/>
+  </ds:schemaRefs>
+</ds:datastoreItem>
+</file>
+
+<file path=customXml/itemProps3.xml><?xml version="1.0" encoding="utf-8"?>
 <ds:datastoreItem xmlns:ds="http://schemas.openxmlformats.org/officeDocument/2006/customXml" ds:itemID="{D7602377-4D0E-4F57-8B88-87CF797A6B5D}">
   <ds:schemaRefs>
     <ds:schemaRef ds:uri="http://schemas.microsoft.com/office/2006/metadata/contentType"/>
@@ -19712,21 +19683,4 @@
     <ds:schemaRef ds:uri="http://schemas.microsoft.com/internal/obd"/>
   </ds:schemaRefs>
 </ds:datastoreItem>
-</file>
-
-<file path=customXml/itemProps3.xml><?xml version="1.0" encoding="utf-8"?>
-<ds:datastoreItem xmlns:ds="http://schemas.openxmlformats.org/officeDocument/2006/customXml" ds:itemID="{04408E98-FD53-4752-B390-626386BBD724}">
-  <ds:schemaRefs>
-    <ds:schemaRef ds:uri="http://purl.org/dc/dcmitype/"/>
-    <ds:schemaRef ds:uri="http://purl.org/dc/terms/"/>
-    <ds:schemaRef ds:uri="http://www.w3.org/XML/1998/namespace"/>
-    <ds:schemaRef ds:uri="http://schemas.microsoft.com/office/2006/metadata/properties"/>
-    <ds:schemaRef ds:uri="http://schemas.microsoft.com/office/infopath/2007/PartnerControls"/>
-    <ds:schemaRef ds:uri="http://schemas.microsoft.com/office/2006/documentManagement/types"/>
-    <ds:schemaRef ds:uri="http://purl.org/dc/elements/1.1/"/>
-    <ds:schemaRef ds:uri="http://schemas.openxmlformats.org/package/2006/metadata/core-properties"/>
-    <ds:schemaRef ds:uri="e06ed288-fd75-4b50-bbed-f5a5df88c31c"/>
-    <ds:schemaRef ds:uri="92c41bee-f0ee-4aa6-9399-a35fbb883510"/>
-  </ds:schemaRefs>
-</ds:datastoreItem>
 </file>
</xml_diff>